<commit_message>
added custom vision service slide
</commit_message>
<xml_diff>
--- a/slides/155. Inchiosa_Horton_Paunic_Singliar_Chang.pptx
+++ b/slides/155. Inchiosa_Horton_Paunic_Singliar_Chang.pptx
@@ -5,10 +5,10 @@
     <p:sldMasterId id="2147484475" r:id="rId4"/>
   </p:sldMasterIdLst>
   <p:notesMasterIdLst>
-    <p:notesMasterId r:id="rId14"/>
+    <p:notesMasterId r:id="rId18"/>
   </p:notesMasterIdLst>
   <p:handoutMasterIdLst>
-    <p:handoutMasterId r:id="rId15"/>
+    <p:handoutMasterId r:id="rId19"/>
   </p:handoutMasterIdLst>
   <p:sldIdLst>
     <p:sldId id="1486" r:id="rId5"/>
@@ -19,7 +19,11 @@
     <p:sldId id="1523" r:id="rId10"/>
     <p:sldId id="1524" r:id="rId11"/>
     <p:sldId id="1525" r:id="rId12"/>
-    <p:sldId id="1516" r:id="rId13"/>
+    <p:sldId id="1526" r:id="rId13"/>
+    <p:sldId id="1527" r:id="rId14"/>
+    <p:sldId id="1528" r:id="rId15"/>
+    <p:sldId id="1529" r:id="rId16"/>
+    <p:sldId id="1516" r:id="rId17"/>
   </p:sldIdLst>
   <p:sldSz cx="12436475" cy="6994525"/>
   <p:notesSz cx="6858000" cy="9144000"/>
@@ -131,6 +135,10 @@
             <p14:sldId id="1523"/>
             <p14:sldId id="1524"/>
             <p14:sldId id="1525"/>
+            <p14:sldId id="1526"/>
+            <p14:sldId id="1527"/>
+            <p14:sldId id="1528"/>
+            <p14:sldId id="1529"/>
             <p14:sldId id="1516"/>
           </p14:sldIdLst>
         </p14:section>
@@ -271,7 +279,7 @@
               <a:rPr lang="en-US" smtClean="0">
                 <a:latin typeface="Segoe UI" pitchFamily="34" charset="0"/>
               </a:rPr>
-              <a:t>12/4/2017 2:02 PM</a:t>
+              <a:t>12/5/2017 2:22 PM</a:t>
             </a:fld>
             <a:endParaRPr lang="en-US" dirty="0">
               <a:latin typeface="Segoe UI" pitchFamily="34" charset="0"/>
@@ -568,7 +576,7 @@
           <a:p>
             <a:fld id="{D18B56EA-E28F-4F92-9F16-7A6F2501B303}" type="datetime8">
               <a:rPr lang="en-US" smtClean="0"/>
-              <a:t>12/4/2017 2:01 PM</a:t>
+              <a:t>12/5/2017 2:21 PM</a:t>
             </a:fld>
             <a:endParaRPr lang="en-US" dirty="0"/>
           </a:p>
@@ -954,7 +962,7 @@
           <a:p>
             <a:fld id="{C1C3D530-3419-45A5-AB8A-2242E8FDFF4E}" type="datetime8">
               <a:rPr lang="en-US" smtClean="0"/>
-              <a:t>12/4/2017 2:01 PM</a:t>
+              <a:t>12/5/2017 2:21 PM</a:t>
             </a:fld>
             <a:endParaRPr lang="en-US" dirty="0"/>
           </a:p>
@@ -988,6 +996,780 @@
     <p:extLst>
       <p:ext uri="{BB962C8B-B14F-4D97-AF65-F5344CB8AC3E}">
         <p14:creationId xmlns:p14="http://schemas.microsoft.com/office/powerpoint/2010/main" val="3990969903"/>
+      </p:ext>
+    </p:extLst>
+  </p:cSld>
+  <p:clrMapOvr>
+    <a:masterClrMapping/>
+  </p:clrMapOvr>
+</p:notes>
+</file>
+
+<file path=ppt/notesSlides/notesSlide10.xml><?xml version="1.0" encoding="utf-8"?>
+<p:notes xmlns:a="http://schemas.openxmlformats.org/drawingml/2006/main" xmlns:r="http://schemas.openxmlformats.org/officeDocument/2006/relationships" xmlns:p="http://schemas.openxmlformats.org/presentationml/2006/main">
+  <p:cSld>
+    <p:spTree>
+      <p:nvGrpSpPr>
+        <p:cNvPr id="1" name=""/>
+        <p:cNvGrpSpPr/>
+        <p:nvPr/>
+      </p:nvGrpSpPr>
+      <p:grpSpPr>
+        <a:xfrm>
+          <a:off x="0" y="0"/>
+          <a:ext cx="0" cy="0"/>
+          <a:chOff x="0" y="0"/>
+          <a:chExt cx="0" cy="0"/>
+        </a:xfrm>
+      </p:grpSpPr>
+      <p:sp>
+        <p:nvSpPr>
+          <p:cNvPr id="2" name="Slide Image Placeholder 1"/>
+          <p:cNvSpPr>
+            <a:spLocks noGrp="1" noRot="1" noChangeAspect="1"/>
+          </p:cNvSpPr>
+          <p:nvPr>
+            <p:ph type="sldImg"/>
+          </p:nvPr>
+        </p:nvSpPr>
+        <p:spPr/>
+      </p:sp>
+      <p:sp>
+        <p:nvSpPr>
+          <p:cNvPr id="3" name="Notes Placeholder 2"/>
+          <p:cNvSpPr>
+            <a:spLocks noGrp="1"/>
+          </p:cNvSpPr>
+          <p:nvPr>
+            <p:ph type="body" idx="1"/>
+          </p:nvPr>
+        </p:nvSpPr>
+        <p:spPr/>
+        <p:txBody>
+          <a:bodyPr/>
+          <a:lstStyle/>
+          <a:p>
+            <a:endParaRPr lang="en-US"/>
+          </a:p>
+        </p:txBody>
+      </p:sp>
+      <p:sp>
+        <p:nvSpPr>
+          <p:cNvPr id="4" name="Header Placeholder 3"/>
+          <p:cNvSpPr>
+            <a:spLocks noGrp="1"/>
+          </p:cNvSpPr>
+          <p:nvPr>
+            <p:ph type="hdr" sz="quarter" idx="10"/>
+          </p:nvPr>
+        </p:nvSpPr>
+        <p:spPr/>
+        <p:txBody>
+          <a:bodyPr/>
+          <a:lstStyle/>
+          <a:p>
+            <a:r>
+              <a:rPr lang="en-US"/>
+              <a:t>Machine Learning, Analytics, &amp; Data Science Conference</a:t>
+            </a:r>
+            <a:endParaRPr lang="en-US" dirty="0"/>
+          </a:p>
+        </p:txBody>
+      </p:sp>
+      <p:sp>
+        <p:nvSpPr>
+          <p:cNvPr id="5" name="Footer Placeholder 4"/>
+          <p:cNvSpPr>
+            <a:spLocks noGrp="1"/>
+          </p:cNvSpPr>
+          <p:nvPr>
+            <p:ph type="ftr" sz="quarter" idx="11"/>
+          </p:nvPr>
+        </p:nvSpPr>
+        <p:spPr/>
+        <p:txBody>
+          <a:bodyPr/>
+          <a:lstStyle/>
+          <a:p>
+            <a:pPr defTabSz="914099" eaLnBrk="0" hangingPunct="0"/>
+            <a:r>
+              <a:rPr lang="en-US" sz="400">
+                <a:gradFill>
+                  <a:gsLst>
+                    <a:gs pos="0">
+                      <a:prstClr val="black"/>
+                    </a:gs>
+                    <a:gs pos="100000">
+                      <a:prstClr val="black"/>
+                    </a:gs>
+                  </a:gsLst>
+                  <a:lin ang="5400000" scaled="0"/>
+                </a:gradFill>
+                <a:latin typeface="Segoe UI" pitchFamily="34" charset="0"/>
+                <a:ea typeface="Segoe UI" pitchFamily="34" charset="0"/>
+                <a:cs typeface="Segoe UI" pitchFamily="34" charset="0"/>
+              </a:rPr>
+              <a:t>© Microsoft Corporation. All rights reserved. MICROSOFT MAKES NO WARRANTIES, EXPRESS, IMPLIED OR STATUTORY, AS TO THE INFORMATION IN THIS PRESENTATION.</a:t>
+            </a:r>
+            <a:endParaRPr lang="en-US" sz="400" dirty="0">
+              <a:gradFill>
+                <a:gsLst>
+                  <a:gs pos="0">
+                    <a:prstClr val="black"/>
+                  </a:gs>
+                  <a:gs pos="100000">
+                    <a:prstClr val="black"/>
+                  </a:gs>
+                </a:gsLst>
+                <a:lin ang="5400000" scaled="0"/>
+              </a:gradFill>
+              <a:latin typeface="Segoe UI" pitchFamily="34" charset="0"/>
+              <a:ea typeface="Segoe UI" pitchFamily="34" charset="0"/>
+              <a:cs typeface="Segoe UI" pitchFamily="34" charset="0"/>
+            </a:endParaRPr>
+          </a:p>
+        </p:txBody>
+      </p:sp>
+      <p:sp>
+        <p:nvSpPr>
+          <p:cNvPr id="6" name="Date Placeholder 5"/>
+          <p:cNvSpPr>
+            <a:spLocks noGrp="1"/>
+          </p:cNvSpPr>
+          <p:nvPr>
+            <p:ph type="dt" idx="12"/>
+          </p:nvPr>
+        </p:nvSpPr>
+        <p:spPr/>
+        <p:txBody>
+          <a:bodyPr/>
+          <a:lstStyle/>
+          <a:p>
+            <a:fld id="{D18B56EA-E28F-4F92-9F16-7A6F2501B303}" type="datetime8">
+              <a:rPr lang="en-US" smtClean="0"/>
+              <a:t>12/5/2017 3:19 PM</a:t>
+            </a:fld>
+            <a:endParaRPr lang="en-US" dirty="0"/>
+          </a:p>
+        </p:txBody>
+      </p:sp>
+      <p:sp>
+        <p:nvSpPr>
+          <p:cNvPr id="7" name="Slide Number Placeholder 6"/>
+          <p:cNvSpPr>
+            <a:spLocks noGrp="1"/>
+          </p:cNvSpPr>
+          <p:nvPr>
+            <p:ph type="sldNum" sz="quarter" idx="13"/>
+          </p:nvPr>
+        </p:nvSpPr>
+        <p:spPr/>
+        <p:txBody>
+          <a:bodyPr/>
+          <a:lstStyle/>
+          <a:p>
+            <a:fld id="{B4008EB6-D09E-4580-8CD6-DDB14511944F}" type="slidenum">
+              <a:rPr lang="en-US" smtClean="0"/>
+              <a:pPr/>
+              <a:t>10</a:t>
+            </a:fld>
+            <a:endParaRPr lang="en-US" dirty="0"/>
+          </a:p>
+        </p:txBody>
+      </p:sp>
+    </p:spTree>
+    <p:extLst>
+      <p:ext uri="{BB962C8B-B14F-4D97-AF65-F5344CB8AC3E}">
+        <p14:creationId xmlns:p14="http://schemas.microsoft.com/office/powerpoint/2010/main" val="1378674730"/>
+      </p:ext>
+    </p:extLst>
+  </p:cSld>
+  <p:clrMapOvr>
+    <a:masterClrMapping/>
+  </p:clrMapOvr>
+</p:notes>
+</file>
+
+<file path=ppt/notesSlides/notesSlide11.xml><?xml version="1.0" encoding="utf-8"?>
+<p:notes xmlns:a="http://schemas.openxmlformats.org/drawingml/2006/main" xmlns:r="http://schemas.openxmlformats.org/officeDocument/2006/relationships" xmlns:p="http://schemas.openxmlformats.org/presentationml/2006/main">
+  <p:cSld>
+    <p:spTree>
+      <p:nvGrpSpPr>
+        <p:cNvPr id="1" name=""/>
+        <p:cNvGrpSpPr/>
+        <p:nvPr/>
+      </p:nvGrpSpPr>
+      <p:grpSpPr>
+        <a:xfrm>
+          <a:off x="0" y="0"/>
+          <a:ext cx="0" cy="0"/>
+          <a:chOff x="0" y="0"/>
+          <a:chExt cx="0" cy="0"/>
+        </a:xfrm>
+      </p:grpSpPr>
+      <p:sp>
+        <p:nvSpPr>
+          <p:cNvPr id="2" name="Slide Image Placeholder 1"/>
+          <p:cNvSpPr>
+            <a:spLocks noGrp="1" noRot="1" noChangeAspect="1"/>
+          </p:cNvSpPr>
+          <p:nvPr>
+            <p:ph type="sldImg"/>
+          </p:nvPr>
+        </p:nvSpPr>
+        <p:spPr/>
+      </p:sp>
+      <p:sp>
+        <p:nvSpPr>
+          <p:cNvPr id="3" name="Notes Placeholder 2"/>
+          <p:cNvSpPr>
+            <a:spLocks noGrp="1"/>
+          </p:cNvSpPr>
+          <p:nvPr>
+            <p:ph type="body" idx="1"/>
+          </p:nvPr>
+        </p:nvSpPr>
+        <p:spPr/>
+        <p:txBody>
+          <a:bodyPr/>
+          <a:lstStyle/>
+          <a:p>
+            <a:endParaRPr lang="en-US"/>
+          </a:p>
+        </p:txBody>
+      </p:sp>
+      <p:sp>
+        <p:nvSpPr>
+          <p:cNvPr id="4" name="Header Placeholder 3"/>
+          <p:cNvSpPr>
+            <a:spLocks noGrp="1"/>
+          </p:cNvSpPr>
+          <p:nvPr>
+            <p:ph type="hdr" sz="quarter" idx="10"/>
+          </p:nvPr>
+        </p:nvSpPr>
+        <p:spPr/>
+        <p:txBody>
+          <a:bodyPr/>
+          <a:lstStyle/>
+          <a:p>
+            <a:r>
+              <a:rPr lang="en-US"/>
+              <a:t>Machine Learning, Analytics, &amp; Data Science Conference</a:t>
+            </a:r>
+            <a:endParaRPr lang="en-US" dirty="0"/>
+          </a:p>
+        </p:txBody>
+      </p:sp>
+      <p:sp>
+        <p:nvSpPr>
+          <p:cNvPr id="5" name="Footer Placeholder 4"/>
+          <p:cNvSpPr>
+            <a:spLocks noGrp="1"/>
+          </p:cNvSpPr>
+          <p:nvPr>
+            <p:ph type="ftr" sz="quarter" idx="11"/>
+          </p:nvPr>
+        </p:nvSpPr>
+        <p:spPr/>
+        <p:txBody>
+          <a:bodyPr/>
+          <a:lstStyle/>
+          <a:p>
+            <a:pPr defTabSz="914099" eaLnBrk="0" hangingPunct="0"/>
+            <a:r>
+              <a:rPr lang="en-US" sz="400">
+                <a:gradFill>
+                  <a:gsLst>
+                    <a:gs pos="0">
+                      <a:prstClr val="black"/>
+                    </a:gs>
+                    <a:gs pos="100000">
+                      <a:prstClr val="black"/>
+                    </a:gs>
+                  </a:gsLst>
+                  <a:lin ang="5400000" scaled="0"/>
+                </a:gradFill>
+                <a:latin typeface="Segoe UI" pitchFamily="34" charset="0"/>
+                <a:ea typeface="Segoe UI" pitchFamily="34" charset="0"/>
+                <a:cs typeface="Segoe UI" pitchFamily="34" charset="0"/>
+              </a:rPr>
+              <a:t>© Microsoft Corporation. All rights reserved. MICROSOFT MAKES NO WARRANTIES, EXPRESS, IMPLIED OR STATUTORY, AS TO THE INFORMATION IN THIS PRESENTATION.</a:t>
+            </a:r>
+            <a:endParaRPr lang="en-US" sz="400" dirty="0">
+              <a:gradFill>
+                <a:gsLst>
+                  <a:gs pos="0">
+                    <a:prstClr val="black"/>
+                  </a:gs>
+                  <a:gs pos="100000">
+                    <a:prstClr val="black"/>
+                  </a:gs>
+                </a:gsLst>
+                <a:lin ang="5400000" scaled="0"/>
+              </a:gradFill>
+              <a:latin typeface="Segoe UI" pitchFamily="34" charset="0"/>
+              <a:ea typeface="Segoe UI" pitchFamily="34" charset="0"/>
+              <a:cs typeface="Segoe UI" pitchFamily="34" charset="0"/>
+            </a:endParaRPr>
+          </a:p>
+        </p:txBody>
+      </p:sp>
+      <p:sp>
+        <p:nvSpPr>
+          <p:cNvPr id="6" name="Date Placeholder 5"/>
+          <p:cNvSpPr>
+            <a:spLocks noGrp="1"/>
+          </p:cNvSpPr>
+          <p:nvPr>
+            <p:ph type="dt" idx="12"/>
+          </p:nvPr>
+        </p:nvSpPr>
+        <p:spPr/>
+        <p:txBody>
+          <a:bodyPr/>
+          <a:lstStyle/>
+          <a:p>
+            <a:fld id="{D18B56EA-E28F-4F92-9F16-7A6F2501B303}" type="datetime8">
+              <a:rPr lang="en-US" smtClean="0"/>
+              <a:t>12/5/2017 3:23 PM</a:t>
+            </a:fld>
+            <a:endParaRPr lang="en-US" dirty="0"/>
+          </a:p>
+        </p:txBody>
+      </p:sp>
+      <p:sp>
+        <p:nvSpPr>
+          <p:cNvPr id="7" name="Slide Number Placeholder 6"/>
+          <p:cNvSpPr>
+            <a:spLocks noGrp="1"/>
+          </p:cNvSpPr>
+          <p:nvPr>
+            <p:ph type="sldNum" sz="quarter" idx="13"/>
+          </p:nvPr>
+        </p:nvSpPr>
+        <p:spPr/>
+        <p:txBody>
+          <a:bodyPr/>
+          <a:lstStyle/>
+          <a:p>
+            <a:fld id="{B4008EB6-D09E-4580-8CD6-DDB14511944F}" type="slidenum">
+              <a:rPr lang="en-US" smtClean="0"/>
+              <a:pPr/>
+              <a:t>11</a:t>
+            </a:fld>
+            <a:endParaRPr lang="en-US" dirty="0"/>
+          </a:p>
+        </p:txBody>
+      </p:sp>
+    </p:spTree>
+    <p:extLst>
+      <p:ext uri="{BB962C8B-B14F-4D97-AF65-F5344CB8AC3E}">
+        <p14:creationId xmlns:p14="http://schemas.microsoft.com/office/powerpoint/2010/main" val="2235819436"/>
+      </p:ext>
+    </p:extLst>
+  </p:cSld>
+  <p:clrMapOvr>
+    <a:masterClrMapping/>
+  </p:clrMapOvr>
+</p:notes>
+</file>
+
+<file path=ppt/notesSlides/notesSlide12.xml><?xml version="1.0" encoding="utf-8"?>
+<p:notes xmlns:a="http://schemas.openxmlformats.org/drawingml/2006/main" xmlns:r="http://schemas.openxmlformats.org/officeDocument/2006/relationships" xmlns:p="http://schemas.openxmlformats.org/presentationml/2006/main">
+  <p:cSld>
+    <p:spTree>
+      <p:nvGrpSpPr>
+        <p:cNvPr id="1" name=""/>
+        <p:cNvGrpSpPr/>
+        <p:nvPr/>
+      </p:nvGrpSpPr>
+      <p:grpSpPr>
+        <a:xfrm>
+          <a:off x="0" y="0"/>
+          <a:ext cx="0" cy="0"/>
+          <a:chOff x="0" y="0"/>
+          <a:chExt cx="0" cy="0"/>
+        </a:xfrm>
+      </p:grpSpPr>
+      <p:sp>
+        <p:nvSpPr>
+          <p:cNvPr id="2" name="Slide Image Placeholder 1"/>
+          <p:cNvSpPr>
+            <a:spLocks noGrp="1" noRot="1" noChangeAspect="1"/>
+          </p:cNvSpPr>
+          <p:nvPr>
+            <p:ph type="sldImg"/>
+          </p:nvPr>
+        </p:nvSpPr>
+        <p:spPr/>
+      </p:sp>
+      <p:sp>
+        <p:nvSpPr>
+          <p:cNvPr id="3" name="Notes Placeholder 2"/>
+          <p:cNvSpPr>
+            <a:spLocks noGrp="1"/>
+          </p:cNvSpPr>
+          <p:nvPr>
+            <p:ph type="body" idx="1"/>
+          </p:nvPr>
+        </p:nvSpPr>
+        <p:spPr/>
+        <p:txBody>
+          <a:bodyPr/>
+          <a:lstStyle/>
+          <a:p>
+            <a:endParaRPr lang="en-US"/>
+          </a:p>
+        </p:txBody>
+      </p:sp>
+      <p:sp>
+        <p:nvSpPr>
+          <p:cNvPr id="4" name="Header Placeholder 3"/>
+          <p:cNvSpPr>
+            <a:spLocks noGrp="1"/>
+          </p:cNvSpPr>
+          <p:nvPr>
+            <p:ph type="hdr" sz="quarter" idx="10"/>
+          </p:nvPr>
+        </p:nvSpPr>
+        <p:spPr/>
+        <p:txBody>
+          <a:bodyPr/>
+          <a:lstStyle/>
+          <a:p>
+            <a:r>
+              <a:rPr lang="en-US"/>
+              <a:t>Machine Learning, Analytics, &amp; Data Science Conference</a:t>
+            </a:r>
+            <a:endParaRPr lang="en-US" dirty="0"/>
+          </a:p>
+        </p:txBody>
+      </p:sp>
+      <p:sp>
+        <p:nvSpPr>
+          <p:cNvPr id="5" name="Footer Placeholder 4"/>
+          <p:cNvSpPr>
+            <a:spLocks noGrp="1"/>
+          </p:cNvSpPr>
+          <p:nvPr>
+            <p:ph type="ftr" sz="quarter" idx="11"/>
+          </p:nvPr>
+        </p:nvSpPr>
+        <p:spPr/>
+        <p:txBody>
+          <a:bodyPr/>
+          <a:lstStyle/>
+          <a:p>
+            <a:pPr defTabSz="914099" eaLnBrk="0" hangingPunct="0"/>
+            <a:r>
+              <a:rPr lang="en-US" sz="400">
+                <a:gradFill>
+                  <a:gsLst>
+                    <a:gs pos="0">
+                      <a:prstClr val="black"/>
+                    </a:gs>
+                    <a:gs pos="100000">
+                      <a:prstClr val="black"/>
+                    </a:gs>
+                  </a:gsLst>
+                  <a:lin ang="5400000" scaled="0"/>
+                </a:gradFill>
+                <a:latin typeface="Segoe UI" pitchFamily="34" charset="0"/>
+                <a:ea typeface="Segoe UI" pitchFamily="34" charset="0"/>
+                <a:cs typeface="Segoe UI" pitchFamily="34" charset="0"/>
+              </a:rPr>
+              <a:t>© Microsoft Corporation. All rights reserved. MICROSOFT MAKES NO WARRANTIES, EXPRESS, IMPLIED OR STATUTORY, AS TO THE INFORMATION IN THIS PRESENTATION.</a:t>
+            </a:r>
+            <a:endParaRPr lang="en-US" sz="400" dirty="0">
+              <a:gradFill>
+                <a:gsLst>
+                  <a:gs pos="0">
+                    <a:prstClr val="black"/>
+                  </a:gs>
+                  <a:gs pos="100000">
+                    <a:prstClr val="black"/>
+                  </a:gs>
+                </a:gsLst>
+                <a:lin ang="5400000" scaled="0"/>
+              </a:gradFill>
+              <a:latin typeface="Segoe UI" pitchFamily="34" charset="0"/>
+              <a:ea typeface="Segoe UI" pitchFamily="34" charset="0"/>
+              <a:cs typeface="Segoe UI" pitchFamily="34" charset="0"/>
+            </a:endParaRPr>
+          </a:p>
+        </p:txBody>
+      </p:sp>
+      <p:sp>
+        <p:nvSpPr>
+          <p:cNvPr id="6" name="Date Placeholder 5"/>
+          <p:cNvSpPr>
+            <a:spLocks noGrp="1"/>
+          </p:cNvSpPr>
+          <p:nvPr>
+            <p:ph type="dt" idx="12"/>
+          </p:nvPr>
+        </p:nvSpPr>
+        <p:spPr/>
+        <p:txBody>
+          <a:bodyPr/>
+          <a:lstStyle/>
+          <a:p>
+            <a:fld id="{D18B56EA-E28F-4F92-9F16-7A6F2501B303}" type="datetime8">
+              <a:rPr lang="en-US" smtClean="0"/>
+              <a:t>12/6/2017 1:01 PM</a:t>
+            </a:fld>
+            <a:endParaRPr lang="en-US" dirty="0"/>
+          </a:p>
+        </p:txBody>
+      </p:sp>
+      <p:sp>
+        <p:nvSpPr>
+          <p:cNvPr id="7" name="Slide Number Placeholder 6"/>
+          <p:cNvSpPr>
+            <a:spLocks noGrp="1"/>
+          </p:cNvSpPr>
+          <p:nvPr>
+            <p:ph type="sldNum" sz="quarter" idx="13"/>
+          </p:nvPr>
+        </p:nvSpPr>
+        <p:spPr/>
+        <p:txBody>
+          <a:bodyPr/>
+          <a:lstStyle/>
+          <a:p>
+            <a:fld id="{B4008EB6-D09E-4580-8CD6-DDB14511944F}" type="slidenum">
+              <a:rPr lang="en-US" smtClean="0"/>
+              <a:pPr/>
+              <a:t>12</a:t>
+            </a:fld>
+            <a:endParaRPr lang="en-US" dirty="0"/>
+          </a:p>
+        </p:txBody>
+      </p:sp>
+    </p:spTree>
+    <p:extLst>
+      <p:ext uri="{BB962C8B-B14F-4D97-AF65-F5344CB8AC3E}">
+        <p14:creationId xmlns:p14="http://schemas.microsoft.com/office/powerpoint/2010/main" val="3833402867"/>
+      </p:ext>
+    </p:extLst>
+  </p:cSld>
+  <p:clrMapOvr>
+    <a:masterClrMapping/>
+  </p:clrMapOvr>
+</p:notes>
+</file>
+
+<file path=ppt/notesSlides/notesSlide13.xml><?xml version="1.0" encoding="utf-8"?>
+<p:notes xmlns:a="http://schemas.openxmlformats.org/drawingml/2006/main" xmlns:r="http://schemas.openxmlformats.org/officeDocument/2006/relationships" xmlns:p="http://schemas.openxmlformats.org/presentationml/2006/main">
+  <p:cSld>
+    <p:spTree>
+      <p:nvGrpSpPr>
+        <p:cNvPr id="1" name=""/>
+        <p:cNvGrpSpPr/>
+        <p:nvPr/>
+      </p:nvGrpSpPr>
+      <p:grpSpPr>
+        <a:xfrm>
+          <a:off x="0" y="0"/>
+          <a:ext cx="0" cy="0"/>
+          <a:chOff x="0" y="0"/>
+          <a:chExt cx="0" cy="0"/>
+        </a:xfrm>
+      </p:grpSpPr>
+      <p:sp>
+        <p:nvSpPr>
+          <p:cNvPr id="2" name="Slide Image Placeholder 1"/>
+          <p:cNvSpPr>
+            <a:spLocks noGrp="1" noRot="1" noChangeAspect="1"/>
+          </p:cNvSpPr>
+          <p:nvPr>
+            <p:ph type="sldImg"/>
+          </p:nvPr>
+        </p:nvSpPr>
+        <p:spPr>
+          <a:xfrm>
+            <a:off x="381000" y="685800"/>
+            <a:ext cx="6096000" cy="3429000"/>
+          </a:xfrm>
+        </p:spPr>
+      </p:sp>
+      <p:sp>
+        <p:nvSpPr>
+          <p:cNvPr id="3" name="Notes Placeholder 2"/>
+          <p:cNvSpPr>
+            <a:spLocks noGrp="1"/>
+          </p:cNvSpPr>
+          <p:nvPr>
+            <p:ph type="body" idx="1"/>
+          </p:nvPr>
+        </p:nvSpPr>
+        <p:spPr/>
+        <p:txBody>
+          <a:bodyPr>
+            <a:normAutofit/>
+          </a:bodyPr>
+          <a:lstStyle/>
+          <a:p>
+            <a:endParaRPr lang="en-US" dirty="0"/>
+          </a:p>
+        </p:txBody>
+      </p:sp>
+      <p:sp>
+        <p:nvSpPr>
+          <p:cNvPr id="4" name="Header Placeholder 3"/>
+          <p:cNvSpPr>
+            <a:spLocks noGrp="1"/>
+          </p:cNvSpPr>
+          <p:nvPr>
+            <p:ph type="hdr" sz="quarter" idx="10"/>
+          </p:nvPr>
+        </p:nvSpPr>
+        <p:spPr>
+          <a:xfrm>
+            <a:off x="0" y="0"/>
+            <a:ext cx="2971800" cy="457200"/>
+          </a:xfrm>
+          <a:prstGeom prst="rect">
+            <a:avLst/>
+          </a:prstGeom>
+        </p:spPr>
+        <p:txBody>
+          <a:bodyPr/>
+          <a:lstStyle/>
+          <a:p>
+            <a:r>
+              <a:rPr lang="en-US" dirty="0">
+                <a:solidFill>
+                  <a:prstClr val="black"/>
+                </a:solidFill>
+              </a:rPr>
+              <a:t>Machine Learning, Analytics, &amp; Data Science Conference</a:t>
+            </a:r>
+          </a:p>
+        </p:txBody>
+      </p:sp>
+      <p:sp>
+        <p:nvSpPr>
+          <p:cNvPr id="5" name="Date Placeholder 4"/>
+          <p:cNvSpPr>
+            <a:spLocks noGrp="1"/>
+          </p:cNvSpPr>
+          <p:nvPr>
+            <p:ph type="dt" idx="11"/>
+          </p:nvPr>
+        </p:nvSpPr>
+        <p:spPr/>
+        <p:txBody>
+          <a:bodyPr/>
+          <a:lstStyle/>
+          <a:p>
+            <a:fld id="{8AB9A6D4-FB34-4BDB-BA1E-7271914431FC}" type="datetime8">
+              <a:rPr lang="en-US" smtClean="0">
+                <a:solidFill>
+                  <a:prstClr val="black"/>
+                </a:solidFill>
+              </a:rPr>
+              <a:t>12/5/2017 2:21 PM</a:t>
+            </a:fld>
+            <a:endParaRPr lang="en-US" dirty="0">
+              <a:solidFill>
+                <a:prstClr val="black"/>
+              </a:solidFill>
+            </a:endParaRPr>
+          </a:p>
+        </p:txBody>
+      </p:sp>
+      <p:sp>
+        <p:nvSpPr>
+          <p:cNvPr id="7" name="Slide Number Placeholder 6"/>
+          <p:cNvSpPr>
+            <a:spLocks noGrp="1"/>
+          </p:cNvSpPr>
+          <p:nvPr>
+            <p:ph type="sldNum" sz="quarter" idx="13"/>
+          </p:nvPr>
+        </p:nvSpPr>
+        <p:spPr/>
+        <p:txBody>
+          <a:bodyPr/>
+          <a:lstStyle/>
+          <a:p>
+            <a:fld id="{EC87E0CF-87F6-4B58-B8B8-DCAB2DAAF3CA}" type="slidenum">
+              <a:rPr lang="en-US" smtClean="0">
+                <a:solidFill>
+                  <a:prstClr val="black"/>
+                </a:solidFill>
+              </a:rPr>
+              <a:pPr/>
+              <a:t>13</a:t>
+            </a:fld>
+            <a:endParaRPr lang="en-US" dirty="0">
+              <a:solidFill>
+                <a:prstClr val="black"/>
+              </a:solidFill>
+            </a:endParaRPr>
+          </a:p>
+        </p:txBody>
+      </p:sp>
+      <p:sp>
+        <p:nvSpPr>
+          <p:cNvPr id="6" name="Footer Placeholder 5"/>
+          <p:cNvSpPr>
+            <a:spLocks noGrp="1"/>
+          </p:cNvSpPr>
+          <p:nvPr>
+            <p:ph type="ftr" sz="quarter" idx="14"/>
+          </p:nvPr>
+        </p:nvSpPr>
+        <p:spPr/>
+        <p:txBody>
+          <a:bodyPr/>
+          <a:lstStyle/>
+          <a:p>
+            <a:pPr defTabSz="914099" eaLnBrk="0" hangingPunct="0"/>
+            <a:r>
+              <a:rPr lang="en-US" sz="400">
+                <a:gradFill>
+                  <a:gsLst>
+                    <a:gs pos="0">
+                      <a:prstClr val="black"/>
+                    </a:gs>
+                    <a:gs pos="100000">
+                      <a:prstClr val="black"/>
+                    </a:gs>
+                  </a:gsLst>
+                  <a:lin ang="5400000" scaled="0"/>
+                </a:gradFill>
+                <a:latin typeface="Segoe UI" pitchFamily="34" charset="0"/>
+                <a:ea typeface="Segoe UI" pitchFamily="34" charset="0"/>
+                <a:cs typeface="Segoe UI" pitchFamily="34" charset="0"/>
+              </a:rPr>
+              <a:t>© Microsoft Corporation. All rights reserved. MICROSOFT MAKES NO WARRANTIES, EXPRESS, IMPLIED OR STATUTORY, AS TO THE INFORMATION IN THIS PRESENTATION.</a:t>
+            </a:r>
+            <a:endParaRPr lang="en-US" sz="400" dirty="0">
+              <a:gradFill>
+                <a:gsLst>
+                  <a:gs pos="0">
+                    <a:prstClr val="black"/>
+                  </a:gs>
+                  <a:gs pos="100000">
+                    <a:prstClr val="black"/>
+                  </a:gs>
+                </a:gsLst>
+                <a:lin ang="5400000" scaled="0"/>
+              </a:gradFill>
+              <a:latin typeface="Segoe UI" pitchFamily="34" charset="0"/>
+              <a:ea typeface="Segoe UI" pitchFamily="34" charset="0"/>
+              <a:cs typeface="Segoe UI" pitchFamily="34" charset="0"/>
+            </a:endParaRPr>
+          </a:p>
+        </p:txBody>
+      </p:sp>
+    </p:spTree>
+    <p:extLst>
+      <p:ext uri="{BB962C8B-B14F-4D97-AF65-F5344CB8AC3E}">
+        <p14:creationId xmlns:p14="http://schemas.microsoft.com/office/powerpoint/2010/main" val="3957329897"/>
       </p:ext>
     </p:extLst>
   </p:cSld>
@@ -1138,7 +1920,7 @@
           <a:p>
             <a:fld id="{3313C66B-7AF5-40BA-8933-D16874FF94CC}" type="datetime8">
               <a:rPr lang="en-US" smtClean="0"/>
-              <a:t>12/4/2017 2:01 PM</a:t>
+              <a:t>12/5/2017 2:21 PM</a:t>
             </a:fld>
             <a:endParaRPr lang="en-US" dirty="0"/>
           </a:p>
@@ -1501,7 +2283,7 @@
           <a:p>
             <a:fld id="{EA2B2ED8-C573-45EF-BF68-CEC19505703A}" type="datetime8">
               <a:rPr lang="en-US" smtClean="0"/>
-              <a:t>12/4/2017 2:01 PM</a:t>
+              <a:t>12/5/2017 2:21 PM</a:t>
             </a:fld>
             <a:endParaRPr lang="en-US" dirty="0"/>
           </a:p>
@@ -1701,7 +2483,7 @@
           <a:p>
             <a:fld id="{5A70A388-5CB4-42F2-85B9-1AE1F63398FA}" type="datetime8">
               <a:rPr lang="en-US" smtClean="0"/>
-              <a:t>12/4/2017 2:01 PM</a:t>
+              <a:t>12/5/2017 2:21 PM</a:t>
             </a:fld>
             <a:endParaRPr lang="en-US" dirty="0"/>
           </a:p>
@@ -1890,7 +2672,7 @@
           <a:p>
             <a:fld id="{6939CF7E-134C-4B4A-9853-17D7568CBCC2}" type="datetime8">
               <a:rPr lang="en-US" smtClean="0"/>
-              <a:t>12/4/2017 2:01 PM</a:t>
+              <a:t>12/5/2017 2:21 PM</a:t>
             </a:fld>
             <a:endParaRPr lang="en-US" dirty="0"/>
           </a:p>
@@ -2108,7 +2890,7 @@
           <a:p>
             <a:fld id="{6939CF7E-134C-4B4A-9853-17D7568CBCC2}" type="datetime8">
               <a:rPr lang="en-US" smtClean="0"/>
-              <a:t>12/4/2017 2:01 PM</a:t>
+              <a:t>12/5/2017 2:21 PM</a:t>
             </a:fld>
             <a:endParaRPr lang="en-US" dirty="0"/>
           </a:p>
@@ -2326,7 +3108,7 @@
           <a:p>
             <a:fld id="{6939CF7E-134C-4B4A-9853-17D7568CBCC2}" type="datetime8">
               <a:rPr lang="en-US" smtClean="0"/>
-              <a:t>12/4/2017 2:35 PM</a:t>
+              <a:t>12/5/2017 2:21 PM</a:t>
             </a:fld>
             <a:endParaRPr lang="en-US" dirty="0"/>
           </a:p>
@@ -2544,7 +3326,7 @@
           <a:p>
             <a:fld id="{6939CF7E-134C-4B4A-9853-17D7568CBCC2}" type="datetime8">
               <a:rPr lang="en-US" smtClean="0"/>
-              <a:t>12/4/2017 2:31 PM</a:t>
+              <a:t>12/5/2017 2:21 PM</a:t>
             </a:fld>
             <a:endParaRPr lang="en-US" dirty="0"/>
           </a:p>
@@ -2703,6 +3485,9 @@
             <a:off x="381000" y="685800"/>
             <a:ext cx="6096000" cy="3429000"/>
           </a:xfrm>
+          <a:prstGeom prst="rect">
+            <a:avLst/>
+          </a:prstGeom>
         </p:spPr>
       </p:sp>
       <p:sp>
@@ -2715,30 +3500,81 @@
             <p:ph type="body" idx="1"/>
           </p:nvPr>
         </p:nvSpPr>
-        <p:spPr/>
+        <p:spPr>
+          <a:xfrm>
+            <a:off x="685800" y="4343400"/>
+            <a:ext cx="5486400" cy="4114800"/>
+          </a:xfrm>
+          <a:prstGeom prst="rect">
+            <a:avLst/>
+          </a:prstGeom>
+        </p:spPr>
         <p:txBody>
           <a:bodyPr>
             <a:normAutofit/>
           </a:bodyPr>
           <a:lstStyle/>
           <a:p>
-            <a:endParaRPr lang="en-US" dirty="0"/>
-          </a:p>
-        </p:txBody>
-      </p:sp>
-      <p:sp>
-        <p:nvSpPr>
-          <p:cNvPr id="4" name="Header Placeholder 3"/>
-          <p:cNvSpPr>
-            <a:spLocks noGrp="1"/>
-          </p:cNvSpPr>
-          <p:nvPr>
-            <p:ph type="hdr" sz="quarter" idx="10"/>
+            <a:r>
+              <a:rPr lang="en-US" dirty="0"/>
+              <a:t>Data is often easier to come by than expert labels</a:t>
+            </a:r>
+          </a:p>
+          <a:p>
+            <a:r>
+              <a:rPr lang="en-US" dirty="0"/>
+              <a:t>Use the preliminary model for triage of unlabeled data </a:t>
+            </a:r>
+          </a:p>
+          <a:p>
+            <a:pPr lvl="1"/>
+            <a:r>
+              <a:rPr lang="en-US" dirty="0"/>
+              <a:t>What is the model good at? What needs work (e.g., more training data)?</a:t>
+            </a:r>
+          </a:p>
+          <a:p>
+            <a:pPr lvl="1"/>
+            <a:r>
+              <a:rPr lang="en-US" dirty="0"/>
+              <a:t>How much of the unlabeled data can we eliminate as already identifiable?</a:t>
+            </a:r>
+          </a:p>
+          <a:p>
+            <a:r>
+              <a:rPr lang="en-US" dirty="0"/>
+              <a:t>Better model -&gt; better triage -&gt; better selection of cases to label -&gt; better model -&gt; ...</a:t>
+            </a:r>
+          </a:p>
+          <a:p>
+            <a:r>
+              <a:rPr lang="en-US" dirty="0"/>
+              <a:t>Companies like </a:t>
+            </a:r>
+            <a:r>
+              <a:rPr lang="en-US" dirty="0" err="1"/>
+              <a:t>CrowdFlower</a:t>
+            </a:r>
+            <a:r>
+              <a:rPr lang="en-US" dirty="0"/>
+              <a:t> and services like the Custom Vision Service use active learning.</a:t>
+            </a:r>
+          </a:p>
+        </p:txBody>
+      </p:sp>
+      <p:sp>
+        <p:nvSpPr>
+          <p:cNvPr id="4" name="Date Placeholder 3"/>
+          <p:cNvSpPr>
+            <a:spLocks noGrp="1"/>
+          </p:cNvSpPr>
+          <p:nvPr>
+            <p:ph type="dt" idx="10"/>
           </p:nvPr>
         </p:nvSpPr>
         <p:spPr>
           <a:xfrm>
-            <a:off x="0" y="0"/>
+            <a:off x="3884613" y="0"/>
             <a:ext cx="2971800" cy="457200"/>
           </a:xfrm>
           <a:prstGeom prst="rect">
@@ -2749,77 +3585,43 @@
           <a:bodyPr/>
           <a:lstStyle/>
           <a:p>
-            <a:r>
-              <a:rPr lang="en-US" dirty="0">
-                <a:solidFill>
-                  <a:prstClr val="black"/>
-                </a:solidFill>
-              </a:rPr>
-              <a:t>Machine Learning, Analytics, &amp; Data Science Conference</a:t>
-            </a:r>
-          </a:p>
-        </p:txBody>
-      </p:sp>
-      <p:sp>
-        <p:nvSpPr>
-          <p:cNvPr id="5" name="Date Placeholder 4"/>
-          <p:cNvSpPr>
-            <a:spLocks noGrp="1"/>
-          </p:cNvSpPr>
-          <p:nvPr>
-            <p:ph type="dt" idx="11"/>
-          </p:nvPr>
-        </p:nvSpPr>
-        <p:spPr/>
+            <a:fld id="{6939CF7E-134C-4B4A-9853-17D7568CBCC2}" type="datetime8">
+              <a:rPr lang="en-US" smtClean="0"/>
+              <a:t>12/5/2017 3:19 PM</a:t>
+            </a:fld>
+            <a:endParaRPr lang="en-US" dirty="0"/>
+          </a:p>
+        </p:txBody>
+      </p:sp>
+      <p:sp>
+        <p:nvSpPr>
+          <p:cNvPr id="7" name="Slide Number Placeholder 6"/>
+          <p:cNvSpPr>
+            <a:spLocks noGrp="1"/>
+          </p:cNvSpPr>
+          <p:nvPr>
+            <p:ph type="sldNum" sz="quarter" idx="12"/>
+          </p:nvPr>
+        </p:nvSpPr>
+        <p:spPr>
+          <a:xfrm>
+            <a:off x="6172199" y="8685213"/>
+            <a:ext cx="684213" cy="457200"/>
+          </a:xfrm>
+          <a:prstGeom prst="rect">
+            <a:avLst/>
+          </a:prstGeom>
+        </p:spPr>
         <p:txBody>
           <a:bodyPr/>
           <a:lstStyle/>
           <a:p>
-            <a:fld id="{8AB9A6D4-FB34-4BDB-BA1E-7271914431FC}" type="datetime8">
-              <a:rPr lang="en-US" smtClean="0">
-                <a:solidFill>
-                  <a:prstClr val="black"/>
-                </a:solidFill>
-              </a:rPr>
-              <a:t>12/4/2017 2:01 PM</a:t>
-            </a:fld>
-            <a:endParaRPr lang="en-US" dirty="0">
-              <a:solidFill>
-                <a:prstClr val="black"/>
-              </a:solidFill>
-            </a:endParaRPr>
-          </a:p>
-        </p:txBody>
-      </p:sp>
-      <p:sp>
-        <p:nvSpPr>
-          <p:cNvPr id="7" name="Slide Number Placeholder 6"/>
-          <p:cNvSpPr>
-            <a:spLocks noGrp="1"/>
-          </p:cNvSpPr>
-          <p:nvPr>
-            <p:ph type="sldNum" sz="quarter" idx="13"/>
-          </p:nvPr>
-        </p:nvSpPr>
-        <p:spPr/>
-        <p:txBody>
-          <a:bodyPr/>
-          <a:lstStyle/>
-          <a:p>
-            <a:fld id="{EC87E0CF-87F6-4B58-B8B8-DCAB2DAAF3CA}" type="slidenum">
-              <a:rPr lang="en-US" smtClean="0">
-                <a:solidFill>
-                  <a:prstClr val="black"/>
-                </a:solidFill>
-              </a:rPr>
+            <a:fld id="{8B263312-38AA-4E1E-B2B5-0F8F122B24FE}" type="slidenum">
+              <a:rPr lang="en-US" smtClean="0"/>
               <a:pPr/>
               <a:t>9</a:t>
             </a:fld>
-            <a:endParaRPr lang="en-US" dirty="0">
-              <a:solidFill>
-                <a:prstClr val="black"/>
-              </a:solidFill>
-            </a:endParaRPr>
+            <a:endParaRPr lang="en-US" dirty="0"/>
           </a:p>
         </p:txBody>
       </p:sp>
@@ -2830,7 +3632,7 @@
             <a:spLocks noGrp="1"/>
           </p:cNvSpPr>
           <p:nvPr>
-            <p:ph type="ftr" sz="quarter" idx="14"/>
+            <p:ph type="ftr" sz="quarter" idx="13"/>
           </p:nvPr>
         </p:nvSpPr>
         <p:spPr/>
@@ -2877,10 +3679,32 @@
           </a:p>
         </p:txBody>
       </p:sp>
+      <p:sp>
+        <p:nvSpPr>
+          <p:cNvPr id="9" name="Header Placeholder 8"/>
+          <p:cNvSpPr>
+            <a:spLocks noGrp="1"/>
+          </p:cNvSpPr>
+          <p:nvPr>
+            <p:ph type="hdr" sz="quarter" idx="14"/>
+          </p:nvPr>
+        </p:nvSpPr>
+        <p:spPr/>
+        <p:txBody>
+          <a:bodyPr/>
+          <a:lstStyle/>
+          <a:p>
+            <a:r>
+              <a:rPr lang="en-US" dirty="0"/>
+              <a:t>Machine Learning, Analytics, &amp; Data Science Conference</a:t>
+            </a:r>
+          </a:p>
+        </p:txBody>
+      </p:sp>
     </p:spTree>
     <p:extLst>
       <p:ext uri="{BB962C8B-B14F-4D97-AF65-F5344CB8AC3E}">
-        <p14:creationId xmlns:p14="http://schemas.microsoft.com/office/powerpoint/2010/main" val="3957329897"/>
+        <p14:creationId xmlns:p14="http://schemas.microsoft.com/office/powerpoint/2010/main" val="3977165676"/>
       </p:ext>
     </p:extLst>
   </p:cSld>
@@ -6994,6 +7818,622 @@
 </p:sld>
 </file>
 
+<file path=ppt/slides/slide10.xml><?xml version="1.0" encoding="utf-8"?>
+<p:sld xmlns:a="http://schemas.openxmlformats.org/drawingml/2006/main" xmlns:r="http://schemas.openxmlformats.org/officeDocument/2006/relationships" xmlns:p="http://schemas.openxmlformats.org/presentationml/2006/main">
+  <p:cSld>
+    <p:spTree>
+      <p:nvGrpSpPr>
+        <p:cNvPr id="1" name=""/>
+        <p:cNvGrpSpPr/>
+        <p:nvPr/>
+      </p:nvGrpSpPr>
+      <p:grpSpPr>
+        <a:xfrm>
+          <a:off x="0" y="0"/>
+          <a:ext cx="0" cy="0"/>
+          <a:chOff x="0" y="0"/>
+          <a:chExt cx="0" cy="0"/>
+        </a:xfrm>
+      </p:grpSpPr>
+      <p:sp>
+        <p:nvSpPr>
+          <p:cNvPr id="2" name="Title 1">
+            <a:extLst>
+              <a:ext uri="{FF2B5EF4-FFF2-40B4-BE49-F238E27FC236}">
+                <a16:creationId xmlns:a16="http://schemas.microsoft.com/office/drawing/2014/main" id="{EDEBF549-3714-4EB1-89D6-90C85951D6A0}"/>
+              </a:ext>
+            </a:extLst>
+          </p:cNvPr>
+          <p:cNvSpPr>
+            <a:spLocks noGrp="1"/>
+          </p:cNvSpPr>
+          <p:nvPr>
+            <p:ph type="title"/>
+          </p:nvPr>
+        </p:nvSpPr>
+        <p:spPr/>
+        <p:txBody>
+          <a:bodyPr/>
+          <a:lstStyle/>
+          <a:p>
+            <a:r>
+              <a:rPr lang="en-US" dirty="0"/>
+              <a:t>Active learning</a:t>
+            </a:r>
+          </a:p>
+        </p:txBody>
+      </p:sp>
+      <p:sp>
+        <p:nvSpPr>
+          <p:cNvPr id="3" name="Text Placeholder 2">
+            <a:extLst>
+              <a:ext uri="{FF2B5EF4-FFF2-40B4-BE49-F238E27FC236}">
+                <a16:creationId xmlns:a16="http://schemas.microsoft.com/office/drawing/2014/main" id="{824A632E-B338-400C-87BD-897359370EFB}"/>
+              </a:ext>
+            </a:extLst>
+          </p:cNvPr>
+          <p:cNvSpPr>
+            <a:spLocks noGrp="1"/>
+          </p:cNvSpPr>
+          <p:nvPr>
+            <p:ph type="body" sz="quarter" idx="10"/>
+          </p:nvPr>
+        </p:nvSpPr>
+        <p:spPr>
+          <a:xfrm>
+            <a:off x="273926" y="1363661"/>
+            <a:ext cx="11889563" cy="5289115"/>
+          </a:xfrm>
+        </p:spPr>
+        <p:txBody>
+          <a:bodyPr/>
+          <a:lstStyle/>
+          <a:p>
+            <a:r>
+              <a:rPr lang="en-US" sz="2800" dirty="0"/>
+              <a:t>In some applications, data is expensive to collect, e. g. experiments in biology</a:t>
+            </a:r>
+          </a:p>
+          <a:p>
+            <a:endParaRPr lang="en-US" sz="2800" dirty="0"/>
+          </a:p>
+          <a:p>
+            <a:r>
+              <a:rPr lang="en-US" sz="2800" dirty="0"/>
+              <a:t>Active learning aims to to improve the model by selecting smallest data set possible in a more target way</a:t>
+            </a:r>
+          </a:p>
+          <a:p>
+            <a:endParaRPr lang="en-US" sz="2800" dirty="0"/>
+          </a:p>
+          <a:p>
+            <a:r>
+              <a:rPr lang="en-US" sz="2800" dirty="0"/>
+              <a:t>Better model -&gt; better triage -&gt; better selection of cases to label -&gt; better model -&gt; ...</a:t>
+            </a:r>
+          </a:p>
+          <a:p>
+            <a:endParaRPr lang="en-US" sz="2800" dirty="0"/>
+          </a:p>
+          <a:p>
+            <a:r>
+              <a:rPr lang="en-US" sz="2800" dirty="0"/>
+              <a:t>Companies like </a:t>
+            </a:r>
+            <a:r>
+              <a:rPr lang="en-US" sz="2800" dirty="0" err="1"/>
+              <a:t>CrowdFlower</a:t>
+            </a:r>
+            <a:r>
+              <a:rPr lang="en-US" sz="2800" dirty="0"/>
+              <a:t> and services like the Custom Vision Service use active learning.</a:t>
+            </a:r>
+          </a:p>
+          <a:p>
+            <a:endParaRPr lang="en-US" sz="2800" dirty="0"/>
+          </a:p>
+        </p:txBody>
+      </p:sp>
+    </p:spTree>
+    <p:extLst>
+      <p:ext uri="{BB962C8B-B14F-4D97-AF65-F5344CB8AC3E}">
+        <p14:creationId xmlns:p14="http://schemas.microsoft.com/office/powerpoint/2010/main" val="3575058080"/>
+      </p:ext>
+    </p:extLst>
+  </p:cSld>
+  <p:clrMapOvr>
+    <a:masterClrMapping/>
+  </p:clrMapOvr>
+  <mc:AlternateContent xmlns:mc="http://schemas.openxmlformats.org/markup-compatibility/2006" xmlns:p14="http://schemas.microsoft.com/office/powerpoint/2010/main">
+    <mc:Choice Requires="p14">
+      <p:transition spd="med" p14:dur="700">
+        <p:fade/>
+      </p:transition>
+    </mc:Choice>
+    <mc:Fallback xmlns="">
+      <p:transition spd="med">
+        <p:fade/>
+      </p:transition>
+    </mc:Fallback>
+  </mc:AlternateContent>
+</p:sld>
+</file>
+
+<file path=ppt/slides/slide11.xml><?xml version="1.0" encoding="utf-8"?>
+<p:sld xmlns:a="http://schemas.openxmlformats.org/drawingml/2006/main" xmlns:r="http://schemas.openxmlformats.org/officeDocument/2006/relationships" xmlns:p="http://schemas.openxmlformats.org/presentationml/2006/main">
+  <p:cSld>
+    <p:spTree>
+      <p:nvGrpSpPr>
+        <p:cNvPr id="1" name=""/>
+        <p:cNvGrpSpPr/>
+        <p:nvPr/>
+      </p:nvGrpSpPr>
+      <p:grpSpPr>
+        <a:xfrm>
+          <a:off x="0" y="0"/>
+          <a:ext cx="0" cy="0"/>
+          <a:chOff x="0" y="0"/>
+          <a:chExt cx="0" cy="0"/>
+        </a:xfrm>
+      </p:grpSpPr>
+      <p:sp>
+        <p:nvSpPr>
+          <p:cNvPr id="2" name="Title 1">
+            <a:extLst>
+              <a:ext uri="{FF2B5EF4-FFF2-40B4-BE49-F238E27FC236}">
+                <a16:creationId xmlns:a16="http://schemas.microsoft.com/office/drawing/2014/main" id="{F7964B2D-030E-44FE-9E5C-860447960301}"/>
+              </a:ext>
+            </a:extLst>
+          </p:cNvPr>
+          <p:cNvSpPr>
+            <a:spLocks noGrp="1"/>
+          </p:cNvSpPr>
+          <p:nvPr>
+            <p:ph type="title"/>
+          </p:nvPr>
+        </p:nvSpPr>
+        <p:spPr/>
+        <p:txBody>
+          <a:bodyPr/>
+          <a:lstStyle/>
+          <a:p>
+            <a:r>
+              <a:rPr lang="en-US" dirty="0"/>
+              <a:t>Query strategies</a:t>
+            </a:r>
+          </a:p>
+        </p:txBody>
+      </p:sp>
+      <p:sp>
+        <p:nvSpPr>
+          <p:cNvPr id="3" name="Text Placeholder 2">
+            <a:extLst>
+              <a:ext uri="{FF2B5EF4-FFF2-40B4-BE49-F238E27FC236}">
+                <a16:creationId xmlns:a16="http://schemas.microsoft.com/office/drawing/2014/main" id="{BFC5FE15-817F-4984-9970-5B00AB40FEFF}"/>
+              </a:ext>
+            </a:extLst>
+          </p:cNvPr>
+          <p:cNvSpPr>
+            <a:spLocks noGrp="1"/>
+          </p:cNvSpPr>
+          <p:nvPr>
+            <p:ph type="body" sz="quarter" idx="10"/>
+          </p:nvPr>
+        </p:nvSpPr>
+        <p:spPr>
+          <a:xfrm>
+            <a:off x="274702" y="1211287"/>
+            <a:ext cx="11888787" cy="5869299"/>
+          </a:xfrm>
+        </p:spPr>
+        <p:txBody>
+          <a:bodyPr/>
+          <a:lstStyle/>
+          <a:p>
+            <a:pPr marL="0" indent="0">
+              <a:buNone/>
+            </a:pPr>
+            <a:r>
+              <a:rPr lang="en-US" sz="2800" dirty="0"/>
+              <a:t>Some of the algorithms for determining which data points should be labeled are</a:t>
+            </a:r>
+            <a:r>
+              <a:rPr lang="en-US" sz="3200" dirty="0"/>
+              <a:t>*</a:t>
+            </a:r>
+            <a:r>
+              <a:rPr lang="en-US" sz="2800" dirty="0"/>
+              <a:t>:</a:t>
+            </a:r>
+          </a:p>
+          <a:p>
+            <a:pPr marL="0" indent="0">
+              <a:buNone/>
+            </a:pPr>
+            <a:endParaRPr lang="en-US" sz="2200" dirty="0"/>
+          </a:p>
+          <a:p>
+            <a:pPr lvl="1"/>
+            <a:r>
+              <a:rPr lang="en-US" sz="2200" dirty="0"/>
+              <a:t>Uncertainty sampling: label those points for which the current model is least certain as to what the correct output should be</a:t>
+            </a:r>
+          </a:p>
+          <a:p>
+            <a:pPr lvl="1"/>
+            <a:endParaRPr lang="en-US" sz="2200" dirty="0"/>
+          </a:p>
+          <a:p>
+            <a:pPr lvl="1"/>
+            <a:r>
+              <a:rPr lang="en-US" sz="2200" dirty="0"/>
+              <a:t>Query by committee: a variety of models are trained on the current labeled data, and vote on the output for unlabeled data; label those points for which the "committee" disagrees the most</a:t>
+            </a:r>
+          </a:p>
+          <a:p>
+            <a:pPr lvl="1"/>
+            <a:endParaRPr lang="en-US" sz="2200" dirty="0"/>
+          </a:p>
+          <a:p>
+            <a:pPr lvl="1"/>
+            <a:r>
+              <a:rPr lang="en-US" sz="2200" dirty="0"/>
+              <a:t>Expected error reduction: label those points that would most reduce the model's generalization error</a:t>
+            </a:r>
+          </a:p>
+          <a:p>
+            <a:pPr lvl="1"/>
+            <a:endParaRPr lang="en-US" sz="2200" dirty="0"/>
+          </a:p>
+          <a:p>
+            <a:pPr lvl="1"/>
+            <a:r>
+              <a:rPr lang="en-US" sz="2200" dirty="0"/>
+              <a:t>Variance reduction: label those points that would minimize output variance, which is one of the components of error</a:t>
+            </a:r>
+          </a:p>
+          <a:p>
+            <a:endParaRPr lang="en-US" sz="2200" dirty="0"/>
+          </a:p>
+        </p:txBody>
+      </p:sp>
+      <p:sp>
+        <p:nvSpPr>
+          <p:cNvPr id="4" name="TextBox 3">
+            <a:extLst>
+              <a:ext uri="{FF2B5EF4-FFF2-40B4-BE49-F238E27FC236}">
+                <a16:creationId xmlns:a16="http://schemas.microsoft.com/office/drawing/2014/main" id="{A82AC7CD-697E-4F1C-93C6-07B6335D735A}"/>
+              </a:ext>
+            </a:extLst>
+          </p:cNvPr>
+          <p:cNvSpPr txBox="1"/>
+          <p:nvPr/>
+        </p:nvSpPr>
+        <p:spPr>
+          <a:xfrm>
+            <a:off x="-106363" y="6621462"/>
+            <a:ext cx="5222392" cy="461665"/>
+          </a:xfrm>
+          <a:prstGeom prst="rect">
+            <a:avLst/>
+          </a:prstGeom>
+          <a:noFill/>
+        </p:spPr>
+        <p:txBody>
+          <a:bodyPr wrap="none" lIns="182880" tIns="146304" rIns="182880" bIns="146304" rtlCol="0">
+            <a:spAutoFit/>
+          </a:bodyPr>
+          <a:lstStyle/>
+          <a:p>
+            <a:pPr>
+              <a:lnSpc>
+                <a:spcPct val="90000"/>
+              </a:lnSpc>
+              <a:spcAft>
+                <a:spcPts val="600"/>
+              </a:spcAft>
+            </a:pPr>
+            <a:r>
+              <a:rPr lang="en-US" sz="1200" dirty="0">
+                <a:gradFill>
+                  <a:gsLst>
+                    <a:gs pos="2917">
+                      <a:schemeClr val="tx1"/>
+                    </a:gs>
+                    <a:gs pos="30000">
+                      <a:schemeClr val="tx1"/>
+                    </a:gs>
+                  </a:gsLst>
+                  <a:lin ang="5400000" scaled="0"/>
+                </a:gradFill>
+              </a:rPr>
+              <a:t>* Source: https://en.wikipedia.org/wiki/Active_learning_(machine_learning)</a:t>
+            </a:r>
+          </a:p>
+        </p:txBody>
+      </p:sp>
+    </p:spTree>
+    <p:extLst>
+      <p:ext uri="{BB962C8B-B14F-4D97-AF65-F5344CB8AC3E}">
+        <p14:creationId xmlns:p14="http://schemas.microsoft.com/office/powerpoint/2010/main" val="2999981792"/>
+      </p:ext>
+    </p:extLst>
+  </p:cSld>
+  <p:clrMapOvr>
+    <a:masterClrMapping/>
+  </p:clrMapOvr>
+  <mc:AlternateContent xmlns:mc="http://schemas.openxmlformats.org/markup-compatibility/2006" xmlns:p14="http://schemas.microsoft.com/office/powerpoint/2010/main">
+    <mc:Choice Requires="p14">
+      <p:transition spd="med" p14:dur="700">
+        <p:fade/>
+      </p:transition>
+    </mc:Choice>
+    <mc:Fallback xmlns="">
+      <p:transition spd="med">
+        <p:fade/>
+      </p:transition>
+    </mc:Fallback>
+  </mc:AlternateContent>
+</p:sld>
+</file>
+
+<file path=ppt/slides/slide12.xml><?xml version="1.0" encoding="utf-8"?>
+<p:sld xmlns:a="http://schemas.openxmlformats.org/drawingml/2006/main" xmlns:r="http://schemas.openxmlformats.org/officeDocument/2006/relationships" xmlns:p="http://schemas.openxmlformats.org/presentationml/2006/main">
+  <p:cSld>
+    <p:spTree>
+      <p:nvGrpSpPr>
+        <p:cNvPr id="1" name=""/>
+        <p:cNvGrpSpPr/>
+        <p:nvPr/>
+      </p:nvGrpSpPr>
+      <p:grpSpPr>
+        <a:xfrm>
+          <a:off x="0" y="0"/>
+          <a:ext cx="0" cy="0"/>
+          <a:chOff x="0" y="0"/>
+          <a:chExt cx="0" cy="0"/>
+        </a:xfrm>
+      </p:grpSpPr>
+      <p:sp>
+        <p:nvSpPr>
+          <p:cNvPr id="2" name="Title 1">
+            <a:extLst>
+              <a:ext uri="{FF2B5EF4-FFF2-40B4-BE49-F238E27FC236}">
+                <a16:creationId xmlns:a16="http://schemas.microsoft.com/office/drawing/2014/main" id="{A8B3A4EC-BB6F-46E6-A931-BDD84395BC90}"/>
+              </a:ext>
+            </a:extLst>
+          </p:cNvPr>
+          <p:cNvSpPr>
+            <a:spLocks noGrp="1"/>
+          </p:cNvSpPr>
+          <p:nvPr>
+            <p:ph type="title"/>
+          </p:nvPr>
+        </p:nvSpPr>
+        <p:spPr/>
+        <p:txBody>
+          <a:bodyPr/>
+          <a:lstStyle/>
+          <a:p>
+            <a:r>
+              <a:rPr lang="en-US" dirty="0"/>
+              <a:t>Custom Vision Service </a:t>
+            </a:r>
+            <a:r>
+              <a:rPr lang="en-US"/>
+              <a:t>on Azure</a:t>
+            </a:r>
+            <a:endParaRPr lang="en-US" dirty="0"/>
+          </a:p>
+        </p:txBody>
+      </p:sp>
+      <p:pic>
+        <p:nvPicPr>
+          <p:cNvPr id="4" name="Picture 3">
+            <a:extLst>
+              <a:ext uri="{FF2B5EF4-FFF2-40B4-BE49-F238E27FC236}">
+                <a16:creationId xmlns:a16="http://schemas.microsoft.com/office/drawing/2014/main" id="{185AC5C4-5D51-410B-9215-97567FE3CDC6}"/>
+              </a:ext>
+            </a:extLst>
+          </p:cNvPr>
+          <p:cNvPicPr>
+            <a:picLocks noChangeAspect="1"/>
+          </p:cNvPicPr>
+          <p:nvPr/>
+        </p:nvPicPr>
+        <p:blipFill>
+          <a:blip r:embed="rId3"/>
+          <a:stretch>
+            <a:fillRect/>
+          </a:stretch>
+        </p:blipFill>
+        <p:spPr>
+          <a:xfrm>
+            <a:off x="1722437" y="2860674"/>
+            <a:ext cx="8458796" cy="3811589"/>
+          </a:xfrm>
+          <a:prstGeom prst="rect">
+            <a:avLst/>
+          </a:prstGeom>
+        </p:spPr>
+      </p:pic>
+      <p:sp>
+        <p:nvSpPr>
+          <p:cNvPr id="3" name="Text Placeholder 2">
+            <a:extLst>
+              <a:ext uri="{FF2B5EF4-FFF2-40B4-BE49-F238E27FC236}">
+                <a16:creationId xmlns:a16="http://schemas.microsoft.com/office/drawing/2014/main" id="{0B1C8283-F53E-4341-8EF4-764771A6443C}"/>
+              </a:ext>
+            </a:extLst>
+          </p:cNvPr>
+          <p:cNvSpPr>
+            <a:spLocks noGrp="1"/>
+          </p:cNvSpPr>
+          <p:nvPr>
+            <p:ph type="body" sz="quarter" idx="10"/>
+          </p:nvPr>
+        </p:nvSpPr>
+        <p:spPr>
+          <a:xfrm>
+            <a:off x="274639" y="1435756"/>
+            <a:ext cx="11584052" cy="1348061"/>
+          </a:xfrm>
+        </p:spPr>
+        <p:txBody>
+          <a:bodyPr/>
+          <a:lstStyle/>
+          <a:p>
+            <a:r>
+              <a:rPr lang="en-US" sz="2800" dirty="0"/>
+              <a:t>Easily customize state-of-the-art computer vision models for your unique use case. Just upload a few labeled images and let Custom Vision Service do the rest.</a:t>
+            </a:r>
+          </a:p>
+        </p:txBody>
+      </p:sp>
+      <p:sp>
+        <p:nvSpPr>
+          <p:cNvPr id="5" name="Rectangle 4">
+            <a:extLst>
+              <a:ext uri="{FF2B5EF4-FFF2-40B4-BE49-F238E27FC236}">
+                <a16:creationId xmlns:a16="http://schemas.microsoft.com/office/drawing/2014/main" id="{7CD96077-7E22-4A0E-890E-DE6B2F92267E}"/>
+              </a:ext>
+            </a:extLst>
+          </p:cNvPr>
+          <p:cNvSpPr/>
+          <p:nvPr/>
+        </p:nvSpPr>
+        <p:spPr bwMode="auto">
+          <a:xfrm>
+            <a:off x="1798637" y="5707062"/>
+            <a:ext cx="8305800" cy="914400"/>
+          </a:xfrm>
+          <a:prstGeom prst="rect">
+            <a:avLst/>
+          </a:prstGeom>
+          <a:noFill/>
+          <a:ln w="19050">
+            <a:solidFill>
+              <a:schemeClr val="accent1"/>
+            </a:solidFill>
+            <a:headEnd type="none" w="med" len="med"/>
+            <a:tailEnd type="none" w="med" len="med"/>
+          </a:ln>
+        </p:spPr>
+        <p:style>
+          <a:lnRef idx="2">
+            <a:schemeClr val="accent1">
+              <a:shade val="50000"/>
+            </a:schemeClr>
+          </a:lnRef>
+          <a:fillRef idx="1">
+            <a:schemeClr val="accent1"/>
+          </a:fillRef>
+          <a:effectRef idx="0">
+            <a:schemeClr val="accent1"/>
+          </a:effectRef>
+          <a:fontRef idx="minor">
+            <a:schemeClr val="lt1"/>
+          </a:fontRef>
+        </p:style>
+        <p:txBody>
+          <a:bodyPr vert="horz" wrap="square" lIns="0" tIns="46637" rIns="0" bIns="46637" numCol="1" rtlCol="0" anchor="ctr" anchorCtr="0" compatLnSpc="1">
+            <a:prstTxWarp prst="textNoShape">
+              <a:avLst/>
+            </a:prstTxWarp>
+          </a:bodyPr>
+          <a:lstStyle/>
+          <a:p>
+            <a:pPr algn="ctr" defTabSz="932472" fontAlgn="base">
+              <a:spcBef>
+                <a:spcPct val="0"/>
+              </a:spcBef>
+              <a:spcAft>
+                <a:spcPct val="0"/>
+              </a:spcAft>
+            </a:pPr>
+            <a:endParaRPr lang="en-US" sz="2000" dirty="0">
+              <a:gradFill>
+                <a:gsLst>
+                  <a:gs pos="0">
+                    <a:srgbClr val="FFFFFF"/>
+                  </a:gs>
+                  <a:gs pos="100000">
+                    <a:srgbClr val="FFFFFF"/>
+                  </a:gs>
+                </a:gsLst>
+                <a:lin ang="5400000" scaled="0"/>
+              </a:gradFill>
+            </a:endParaRPr>
+          </a:p>
+        </p:txBody>
+      </p:sp>
+    </p:spTree>
+    <p:extLst>
+      <p:ext uri="{BB962C8B-B14F-4D97-AF65-F5344CB8AC3E}">
+        <p14:creationId xmlns:p14="http://schemas.microsoft.com/office/powerpoint/2010/main" val="1302832471"/>
+      </p:ext>
+    </p:extLst>
+  </p:cSld>
+  <p:clrMapOvr>
+    <a:masterClrMapping/>
+  </p:clrMapOvr>
+  <mc:AlternateContent xmlns:mc="http://schemas.openxmlformats.org/markup-compatibility/2006" xmlns:p14="http://schemas.microsoft.com/office/powerpoint/2010/main">
+    <mc:Choice Requires="p14">
+      <p:transition spd="med" p14:dur="700">
+        <p:fade/>
+      </p:transition>
+    </mc:Choice>
+    <mc:Fallback xmlns="">
+      <p:transition spd="med">
+        <p:fade/>
+      </p:transition>
+    </mc:Fallback>
+  </mc:AlternateContent>
+</p:sld>
+</file>
+
+<file path=ppt/slides/slide13.xml><?xml version="1.0" encoding="utf-8"?>
+<p:sld xmlns:a="http://schemas.openxmlformats.org/drawingml/2006/main" xmlns:r="http://schemas.openxmlformats.org/officeDocument/2006/relationships" xmlns:p="http://schemas.openxmlformats.org/presentationml/2006/main">
+  <p:cSld>
+    <p:spTree>
+      <p:nvGrpSpPr>
+        <p:cNvPr id="1" name=""/>
+        <p:cNvGrpSpPr/>
+        <p:nvPr/>
+      </p:nvGrpSpPr>
+      <p:grpSpPr>
+        <a:xfrm>
+          <a:off x="0" y="0"/>
+          <a:ext cx="0" cy="0"/>
+          <a:chOff x="0" y="0"/>
+          <a:chExt cx="0" cy="0"/>
+        </a:xfrm>
+      </p:grpSpPr>
+    </p:spTree>
+    <p:extLst>
+      <p:ext uri="{BB962C8B-B14F-4D97-AF65-F5344CB8AC3E}">
+        <p14:creationId xmlns:p14="http://schemas.microsoft.com/office/powerpoint/2010/main" val="1897784522"/>
+      </p:ext>
+    </p:extLst>
+  </p:cSld>
+  <p:clrMapOvr>
+    <a:masterClrMapping/>
+  </p:clrMapOvr>
+  <mc:AlternateContent xmlns:mc="http://schemas.openxmlformats.org/markup-compatibility/2006" xmlns:p14="http://schemas.microsoft.com/office/powerpoint/2010/main">
+    <mc:Choice Requires="p14">
+      <p:transition spd="med" p14:dur="700">
+        <p:fade/>
+      </p:transition>
+    </mc:Choice>
+    <mc:Fallback xmlns="">
+      <p:transition spd="med">
+        <p:fade/>
+      </p:transition>
+    </mc:Fallback>
+  </mc:AlternateContent>
+</p:sld>
+</file>
+
 <file path=ppt/slides/slide2.xml><?xml version="1.0" encoding="utf-8"?>
 <p:sld xmlns:a="http://schemas.openxmlformats.org/drawingml/2006/main" xmlns:r="http://schemas.openxmlformats.org/officeDocument/2006/relationships" xmlns:p="http://schemas.openxmlformats.org/presentationml/2006/main">
   <p:cSld>
@@ -9058,10 +10498,192 @@
           <a:chExt cx="0" cy="0"/>
         </a:xfrm>
       </p:grpSpPr>
+      <p:sp>
+        <p:nvSpPr>
+          <p:cNvPr id="3" name="Text Placeholder 2" descr="In the sawmill industry lumber grading is an important step of the manufacturing process. &#10;&#10;Improved grading accuracy and better control of quality variation in production leads directly to improved profits. &#10;&#10;Grading has traditionally been done by visual inspection, in which a (human) grader marks each piece of lumber as it leaves the mill, according to a factors like size, category, and position of knots, cracks, species of tree, etc.&#10;&#10;A number of automated lumber grading systems have been developed which aim to improve the accuracy and the efficiency of lumber grading.&#10;" title="Domain: wood knots and lumber grading"/>
+          <p:cNvSpPr>
+            <a:spLocks noGrp="1"/>
+          </p:cNvSpPr>
+          <p:nvPr>
+            <p:ph type="body" sz="quarter" idx="4294967295"/>
+          </p:nvPr>
+        </p:nvSpPr>
+        <p:spPr>
+          <a:xfrm>
+            <a:off x="272274" y="1343939"/>
+            <a:ext cx="6250763" cy="5773888"/>
+          </a:xfrm>
+        </p:spPr>
+        <p:txBody>
+          <a:bodyPr/>
+          <a:lstStyle/>
+          <a:p>
+            <a:r>
+              <a:rPr lang="en-US" sz="2400" dirty="0"/>
+              <a:t>Active learning is a case of semi-supervised learning in which an algorithm interactively asks for additional labeled data that would result in most gain in model performance</a:t>
+            </a:r>
+          </a:p>
+          <a:p>
+            <a:endParaRPr lang="en-US" sz="2400" dirty="0"/>
+          </a:p>
+          <a:p>
+            <a:r>
+              <a:rPr lang="en-US" sz="2400" dirty="0"/>
+              <a:t>Data (unlabeled) is often easier to come by than expert labelers</a:t>
+            </a:r>
+          </a:p>
+          <a:p>
+            <a:endParaRPr lang="en-US" sz="2400" dirty="0"/>
+          </a:p>
+          <a:p>
+            <a:r>
+              <a:rPr lang="en-US" sz="2400" dirty="0"/>
+              <a:t>Active learning starts with a base classifier and looks for which samples should I get more of to improve my classifier the most? </a:t>
+            </a:r>
+          </a:p>
+          <a:p>
+            <a:pPr lvl="1"/>
+            <a:r>
+              <a:rPr lang="en-US" sz="2000" dirty="0"/>
+              <a:t>What is the model good at? What needs work (e.g., more training data)?</a:t>
+            </a:r>
+          </a:p>
+          <a:p>
+            <a:pPr lvl="1"/>
+            <a:r>
+              <a:rPr lang="en-US" sz="2000" dirty="0"/>
+              <a:t>How much of the unlabeled data can we eliminate as already identifiable?</a:t>
+            </a:r>
+          </a:p>
+          <a:p>
+            <a:endParaRPr lang="en-US" sz="2400" dirty="0"/>
+          </a:p>
+        </p:txBody>
+      </p:sp>
+      <p:sp>
+        <p:nvSpPr>
+          <p:cNvPr id="2" name="Title 1"/>
+          <p:cNvSpPr>
+            <a:spLocks noGrp="1"/>
+          </p:cNvSpPr>
+          <p:nvPr>
+            <p:ph type="title"/>
+          </p:nvPr>
+        </p:nvSpPr>
+        <p:spPr/>
+        <p:txBody>
+          <a:bodyPr/>
+          <a:lstStyle/>
+          <a:p>
+            <a:r>
+              <a:rPr lang="en-US" dirty="0"/>
+              <a:t>Active Learning</a:t>
+            </a:r>
+            <a:endParaRPr lang="en-US" sz="4000" dirty="0">
+              <a:gradFill>
+                <a:gsLst>
+                  <a:gs pos="21538">
+                    <a:schemeClr val="tx1"/>
+                  </a:gs>
+                  <a:gs pos="33000">
+                    <a:schemeClr val="tx1"/>
+                  </a:gs>
+                </a:gsLst>
+                <a:lin ang="5400000" scaled="0"/>
+              </a:gradFill>
+            </a:endParaRPr>
+          </a:p>
+        </p:txBody>
+      </p:sp>
+      <p:pic>
+        <p:nvPicPr>
+          <p:cNvPr id="4" name="Picture 3">
+            <a:extLst>
+              <a:ext uri="{FF2B5EF4-FFF2-40B4-BE49-F238E27FC236}">
+                <a16:creationId xmlns:a16="http://schemas.microsoft.com/office/drawing/2014/main" id="{AEA01D66-F11A-41C7-9C4D-AA78EB9EACB6}"/>
+              </a:ext>
+            </a:extLst>
+          </p:cNvPr>
+          <p:cNvPicPr>
+            <a:picLocks noChangeAspect="1"/>
+          </p:cNvPicPr>
+          <p:nvPr/>
+        </p:nvPicPr>
+        <p:blipFill>
+          <a:blip r:embed="rId3"/>
+          <a:stretch>
+            <a:fillRect/>
+          </a:stretch>
+        </p:blipFill>
+        <p:spPr>
+          <a:xfrm>
+            <a:off x="6904037" y="2049462"/>
+            <a:ext cx="5353050" cy="2783650"/>
+          </a:xfrm>
+          <a:prstGeom prst="rect">
+            <a:avLst/>
+          </a:prstGeom>
+        </p:spPr>
+      </p:pic>
+      <p:sp>
+        <p:nvSpPr>
+          <p:cNvPr id="5" name="TextBox 4">
+            <a:extLst>
+              <a:ext uri="{FF2B5EF4-FFF2-40B4-BE49-F238E27FC236}">
+                <a16:creationId xmlns:a16="http://schemas.microsoft.com/office/drawing/2014/main" id="{1E476D08-A00C-46F2-B019-FE8EABB57A9F}"/>
+              </a:ext>
+            </a:extLst>
+          </p:cNvPr>
+          <p:cNvSpPr txBox="1"/>
+          <p:nvPr/>
+        </p:nvSpPr>
+        <p:spPr>
+          <a:xfrm>
+            <a:off x="6751637" y="4833112"/>
+            <a:ext cx="5353050" cy="461665"/>
+          </a:xfrm>
+          <a:prstGeom prst="rect">
+            <a:avLst/>
+          </a:prstGeom>
+          <a:noFill/>
+        </p:spPr>
+        <p:txBody>
+          <a:bodyPr wrap="square" lIns="182880" tIns="146304" rIns="182880" bIns="146304" rtlCol="0">
+            <a:spAutoFit/>
+          </a:bodyPr>
+          <a:lstStyle/>
+          <a:p>
+            <a:pPr>
+              <a:lnSpc>
+                <a:spcPct val="90000"/>
+              </a:lnSpc>
+              <a:spcAft>
+                <a:spcPts val="600"/>
+              </a:spcAft>
+            </a:pPr>
+            <a:r>
+              <a:rPr lang="en-US" sz="1200" dirty="0">
+                <a:gradFill>
+                  <a:gsLst>
+                    <a:gs pos="2917">
+                      <a:schemeClr val="tx1"/>
+                    </a:gs>
+                    <a:gs pos="30000">
+                      <a:schemeClr val="tx1"/>
+                    </a:gs>
+                  </a:gsLst>
+                  <a:lin ang="5400000" scaled="0"/>
+                </a:gradFill>
+              </a:rPr>
+              <a:t>* Image taken from https://www.crowdflower.com</a:t>
+            </a:r>
+          </a:p>
+        </p:txBody>
+      </p:sp>
     </p:spTree>
     <p:extLst>
       <p:ext uri="{BB962C8B-B14F-4D97-AF65-F5344CB8AC3E}">
-        <p14:creationId xmlns:p14="http://schemas.microsoft.com/office/powerpoint/2010/main" val="1897784522"/>
+        <p14:creationId xmlns:p14="http://schemas.microsoft.com/office/powerpoint/2010/main" val="3039089675"/>
       </p:ext>
     </p:extLst>
   </p:cSld>
@@ -9944,12 +11566,94 @@
 </file>
 
 <file path=customXml/item1.xml><?xml version="1.0" encoding="utf-8"?>
-<?mso-contentType ?>
-<FormTemplates xmlns="http://schemas.microsoft.com/sharepoint/v3/contenttype/forms">
-  <Display>DocumentLibraryForm</Display>
-  <Edit>DocumentLibraryForm</Edit>
-  <New>DocumentLibraryForm</New>
-</FormTemplates>
+<p:properties xmlns:p="http://schemas.microsoft.com/office/2006/metadata/properties" xmlns:xsi="http://www.w3.org/2001/XMLSchema-instance" xmlns:pc="http://schemas.microsoft.com/office/infopath/2007/PartnerControls">
+  <documentManagement>
+    <LikesCount xmlns="http://schemas.microsoft.com/sharepoint/v3" xsi:nil="true"/>
+    <_ip_UnifiedCompliancePolicyUIAction xmlns="http://schemas.microsoft.com/sharepoint/v3" xsi:nil="true"/>
+    <_ip_UnifiedCompliancePolicyProperties xmlns="http://schemas.microsoft.com/sharepoint/v3" xsi:nil="true"/>
+    <TaxKeywordTaxHTField xmlns="230e9df3-be65-4c73-a93b-d1236ebd677e">
+      <Terms xmlns="http://schemas.microsoft.com/office/infopath/2007/PartnerControls">
+        <TermInfo xmlns="http://schemas.microsoft.com/office/infopath/2007/PartnerControls">
+          <TermName xmlns="http://schemas.microsoft.com/office/infopath/2007/PartnerControls">machine learning</TermName>
+          <TermId xmlns="http://schemas.microsoft.com/office/infopath/2007/PartnerControls">912b89bd-3197-4d37-838b-dea3c299099a</TermId>
+        </TermInfo>
+        <TermInfo xmlns="http://schemas.microsoft.com/office/infopath/2007/PartnerControls">
+          <TermName xmlns="http://schemas.microsoft.com/office/infopath/2007/PartnerControls">AI ＆ Data Science Conference</TermName>
+          <TermId xmlns="http://schemas.microsoft.com/office/infopath/2007/PartnerControls">8f010730-a012-41a8-b19a-7b5a9af03b6a</TermId>
+        </TermInfo>
+      </Terms>
+    </TaxKeywordTaxHTField>
+    <TaxCatchAll xmlns="230e9df3-be65-4c73-a93b-d1236ebd677e">
+      <Value>69</Value>
+      <Value>131</Value>
+      <Value>20</Value>
+      <Value>72</Value>
+      <Value>169</Value>
+    </TaxCatchAll>
+    <Event_x0020_Start_x0020_Date xmlns="04e01bb1-6d80-42e9-ae53-416b1e8aa845">2017-12-07T00:00:00+00:00</Event_x0020_Start_x0020_Date>
+    <External_x0020_Speaker xmlns="04e01bb1-6d80-42e9-ae53-416b1e8aa845" xsi:nil="true"/>
+    <Presentation_x0020_Date xmlns="04e01bb1-6d80-42e9-ae53-416b1e8aa845" xsi:nil="true"/>
+    <MS_x0020_Content_x0020_Owner xmlns="04e01bb1-6d80-42e9-ae53-416b1e8aa845">
+      <UserInfo>
+        <DisplayName/>
+        <AccountId xsi:nil="true"/>
+        <AccountType/>
+      </UserInfo>
+    </MS_x0020_Content_x0020_Owner>
+    <Session_x0020_Code xmlns="04e01bb1-6d80-42e9-ae53-416b1e8aa845" xsi:nil="true"/>
+    <Event_x0020_End_x0020_Date xmlns="04e01bb1-6d80-42e9-ae53-416b1e8aa845">2017-12-08T00:00:00+00:00</Event_x0020_End_x0020_Date>
+    <MS_x0020_Speaker xmlns="04e01bb1-6d80-42e9-ae53-416b1e8aa845">
+      <UserInfo>
+        <DisplayName/>
+        <AccountId xsi:nil="true"/>
+        <AccountType/>
+      </UserInfo>
+    </MS_x0020_Speaker>
+    <_x0062_bc8 xmlns="e889e55c-35cf-43c7-aaf4-cf2500919dd8">
+      <UserInfo>
+        <DisplayName/>
+        <AccountId xsi:nil="true"/>
+        <AccountType/>
+      </UserInfo>
+    </_x0062_bc8>
+    <fb4e50409e3b4517bb965b3c7125e153 xmlns="04e01bb1-6d80-42e9-ae53-416b1e8aa845">
+      <Terms xmlns="http://schemas.microsoft.com/office/infopath/2007/PartnerControls"/>
+    </fb4e50409e3b4517bb965b3c7125e153>
+    <l61c8586195b4657a1f710a539f9bc3a xmlns="04e01bb1-6d80-42e9-ae53-416b1e8aa845">
+      <Terms xmlns="http://schemas.microsoft.com/office/infopath/2007/PartnerControls">
+        <TermInfo xmlns="http://schemas.microsoft.com/office/infopath/2007/PartnerControls">
+          <TermName xmlns="http://schemas.microsoft.com/office/infopath/2007/PartnerControls">Microsoft Conference Center</TermName>
+          <TermId xmlns="http://schemas.microsoft.com/office/infopath/2007/PartnerControls">9ee5e79d-18a6-44c6-bfde-7021198eb4fc</TermId>
+        </TermInfo>
+      </Terms>
+    </l61c8586195b4657a1f710a539f9bc3a>
+    <a645af38eebb4a1ea4744f163c56ea26 xmlns="04e01bb1-6d80-42e9-ae53-416b1e8aa845">
+      <Terms xmlns="http://schemas.microsoft.com/office/infopath/2007/PartnerControls"/>
+    </a645af38eebb4a1ea4744f163c56ea26>
+    <g60601ae6c3e4c409eb6a70077dda16d xmlns="04e01bb1-6d80-42e9-ae53-416b1e8aa845">
+      <Terms xmlns="http://schemas.microsoft.com/office/infopath/2007/PartnerControls">
+        <TermInfo xmlns="http://schemas.microsoft.com/office/infopath/2007/PartnerControls">
+          <TermName xmlns="http://schemas.microsoft.com/office/infopath/2007/PartnerControls">Microsoft Redmond Campus</TermName>
+          <TermId xmlns="http://schemas.microsoft.com/office/infopath/2007/PartnerControls">3cd96142-cb30-40de-9c66-cd17f1bb8ca1</TermId>
+        </TermInfo>
+      </Terms>
+    </g60601ae6c3e4c409eb6a70077dda16d>
+    <e6bd9c8ce3ed4fe68161c78952f36fbc xmlns="04e01bb1-6d80-42e9-ae53-416b1e8aa845">
+      <Terms xmlns="http://schemas.microsoft.com/office/infopath/2007/PartnerControls"/>
+    </e6bd9c8ce3ed4fe68161c78952f36fbc>
+    <e349cd3f156b4e7d8653c9cd4f2d8fb4 xmlns="04e01bb1-6d80-42e9-ae53-416b1e8aa845">
+      <Terms xmlns="http://schemas.microsoft.com/office/infopath/2007/PartnerControls">
+        <TermInfo xmlns="http://schemas.microsoft.com/office/infopath/2007/PartnerControls">
+          <TermName xmlns="http://schemas.microsoft.com/office/infopath/2007/PartnerControls">Machine Learning, AI and Data Science Conference</TermName>
+          <TermId xmlns="http://schemas.microsoft.com/office/infopath/2007/PartnerControls">2f5995e3-1e3d-4c27-96d6-c6c80990926c</TermId>
+        </TermInfo>
+      </Terms>
+    </e349cd3f156b4e7d8653c9cd4f2d8fb4>
+    <c2f1b796fca04ddbb48af271e99c8750 xmlns="04e01bb1-6d80-42e9-ae53-416b1e8aa845">
+      <Terms xmlns="http://schemas.microsoft.com/office/infopath/2007/PartnerControls"/>
+    </c2f1b796fca04ddbb48af271e99c8750>
+  </documentManagement>
+</p:properties>
 </file>
 
 <file path=customXml/item2.xml><?xml version="1.0" encoding="utf-8"?>
@@ -10352,100 +12056,29 @@
 </file>
 
 <file path=customXml/item3.xml><?xml version="1.0" encoding="utf-8"?>
-<p:properties xmlns:p="http://schemas.microsoft.com/office/2006/metadata/properties" xmlns:xsi="http://www.w3.org/2001/XMLSchema-instance" xmlns:pc="http://schemas.microsoft.com/office/infopath/2007/PartnerControls">
-  <documentManagement>
-    <LikesCount xmlns="http://schemas.microsoft.com/sharepoint/v3" xsi:nil="true"/>
-    <_ip_UnifiedCompliancePolicyUIAction xmlns="http://schemas.microsoft.com/sharepoint/v3" xsi:nil="true"/>
-    <_ip_UnifiedCompliancePolicyProperties xmlns="http://schemas.microsoft.com/sharepoint/v3" xsi:nil="true"/>
-    <TaxKeywordTaxHTField xmlns="230e9df3-be65-4c73-a93b-d1236ebd677e">
-      <Terms xmlns="http://schemas.microsoft.com/office/infopath/2007/PartnerControls">
-        <TermInfo xmlns="http://schemas.microsoft.com/office/infopath/2007/PartnerControls">
-          <TermName xmlns="http://schemas.microsoft.com/office/infopath/2007/PartnerControls">machine learning</TermName>
-          <TermId xmlns="http://schemas.microsoft.com/office/infopath/2007/PartnerControls">912b89bd-3197-4d37-838b-dea3c299099a</TermId>
-        </TermInfo>
-        <TermInfo xmlns="http://schemas.microsoft.com/office/infopath/2007/PartnerControls">
-          <TermName xmlns="http://schemas.microsoft.com/office/infopath/2007/PartnerControls">AI ＆ Data Science Conference</TermName>
-          <TermId xmlns="http://schemas.microsoft.com/office/infopath/2007/PartnerControls">8f010730-a012-41a8-b19a-7b5a9af03b6a</TermId>
-        </TermInfo>
-      </Terms>
-    </TaxKeywordTaxHTField>
-    <TaxCatchAll xmlns="230e9df3-be65-4c73-a93b-d1236ebd677e">
-      <Value>69</Value>
-      <Value>131</Value>
-      <Value>20</Value>
-      <Value>72</Value>
-      <Value>169</Value>
-    </TaxCatchAll>
-    <Event_x0020_Start_x0020_Date xmlns="04e01bb1-6d80-42e9-ae53-416b1e8aa845">2017-12-07T00:00:00+00:00</Event_x0020_Start_x0020_Date>
-    <External_x0020_Speaker xmlns="04e01bb1-6d80-42e9-ae53-416b1e8aa845" xsi:nil="true"/>
-    <Presentation_x0020_Date xmlns="04e01bb1-6d80-42e9-ae53-416b1e8aa845" xsi:nil="true"/>
-    <MS_x0020_Content_x0020_Owner xmlns="04e01bb1-6d80-42e9-ae53-416b1e8aa845">
-      <UserInfo>
-        <DisplayName/>
-        <AccountId xsi:nil="true"/>
-        <AccountType/>
-      </UserInfo>
-    </MS_x0020_Content_x0020_Owner>
-    <Session_x0020_Code xmlns="04e01bb1-6d80-42e9-ae53-416b1e8aa845" xsi:nil="true"/>
-    <Event_x0020_End_x0020_Date xmlns="04e01bb1-6d80-42e9-ae53-416b1e8aa845">2017-12-08T00:00:00+00:00</Event_x0020_End_x0020_Date>
-    <MS_x0020_Speaker xmlns="04e01bb1-6d80-42e9-ae53-416b1e8aa845">
-      <UserInfo>
-        <DisplayName/>
-        <AccountId xsi:nil="true"/>
-        <AccountType/>
-      </UserInfo>
-    </MS_x0020_Speaker>
-    <_x0062_bc8 xmlns="e889e55c-35cf-43c7-aaf4-cf2500919dd8">
-      <UserInfo>
-        <DisplayName/>
-        <AccountId xsi:nil="true"/>
-        <AccountType/>
-      </UserInfo>
-    </_x0062_bc8>
-    <fb4e50409e3b4517bb965b3c7125e153 xmlns="04e01bb1-6d80-42e9-ae53-416b1e8aa845">
-      <Terms xmlns="http://schemas.microsoft.com/office/infopath/2007/PartnerControls"/>
-    </fb4e50409e3b4517bb965b3c7125e153>
-    <l61c8586195b4657a1f710a539f9bc3a xmlns="04e01bb1-6d80-42e9-ae53-416b1e8aa845">
-      <Terms xmlns="http://schemas.microsoft.com/office/infopath/2007/PartnerControls">
-        <TermInfo xmlns="http://schemas.microsoft.com/office/infopath/2007/PartnerControls">
-          <TermName xmlns="http://schemas.microsoft.com/office/infopath/2007/PartnerControls">Microsoft Conference Center</TermName>
-          <TermId xmlns="http://schemas.microsoft.com/office/infopath/2007/PartnerControls">9ee5e79d-18a6-44c6-bfde-7021198eb4fc</TermId>
-        </TermInfo>
-      </Terms>
-    </l61c8586195b4657a1f710a539f9bc3a>
-    <a645af38eebb4a1ea4744f163c56ea26 xmlns="04e01bb1-6d80-42e9-ae53-416b1e8aa845">
-      <Terms xmlns="http://schemas.microsoft.com/office/infopath/2007/PartnerControls"/>
-    </a645af38eebb4a1ea4744f163c56ea26>
-    <g60601ae6c3e4c409eb6a70077dda16d xmlns="04e01bb1-6d80-42e9-ae53-416b1e8aa845">
-      <Terms xmlns="http://schemas.microsoft.com/office/infopath/2007/PartnerControls">
-        <TermInfo xmlns="http://schemas.microsoft.com/office/infopath/2007/PartnerControls">
-          <TermName xmlns="http://schemas.microsoft.com/office/infopath/2007/PartnerControls">Microsoft Redmond Campus</TermName>
-          <TermId xmlns="http://schemas.microsoft.com/office/infopath/2007/PartnerControls">3cd96142-cb30-40de-9c66-cd17f1bb8ca1</TermId>
-        </TermInfo>
-      </Terms>
-    </g60601ae6c3e4c409eb6a70077dda16d>
-    <e6bd9c8ce3ed4fe68161c78952f36fbc xmlns="04e01bb1-6d80-42e9-ae53-416b1e8aa845">
-      <Terms xmlns="http://schemas.microsoft.com/office/infopath/2007/PartnerControls"/>
-    </e6bd9c8ce3ed4fe68161c78952f36fbc>
-    <e349cd3f156b4e7d8653c9cd4f2d8fb4 xmlns="04e01bb1-6d80-42e9-ae53-416b1e8aa845">
-      <Terms xmlns="http://schemas.microsoft.com/office/infopath/2007/PartnerControls">
-        <TermInfo xmlns="http://schemas.microsoft.com/office/infopath/2007/PartnerControls">
-          <TermName xmlns="http://schemas.microsoft.com/office/infopath/2007/PartnerControls">Machine Learning, AI and Data Science Conference</TermName>
-          <TermId xmlns="http://schemas.microsoft.com/office/infopath/2007/PartnerControls">2f5995e3-1e3d-4c27-96d6-c6c80990926c</TermId>
-        </TermInfo>
-      </Terms>
-    </e349cd3f156b4e7d8653c9cd4f2d8fb4>
-    <c2f1b796fca04ddbb48af271e99c8750 xmlns="04e01bb1-6d80-42e9-ae53-416b1e8aa845">
-      <Terms xmlns="http://schemas.microsoft.com/office/infopath/2007/PartnerControls"/>
-    </c2f1b796fca04ddbb48af271e99c8750>
-  </documentManagement>
-</p:properties>
+<?mso-contentType ?>
+<FormTemplates xmlns="http://schemas.microsoft.com/sharepoint/v3/contenttype/forms">
+  <Display>DocumentLibraryForm</Display>
+  <Edit>DocumentLibraryForm</Edit>
+  <New>DocumentLibraryForm</New>
+</FormTemplates>
 </file>
 
 <file path=customXml/itemProps1.xml><?xml version="1.0" encoding="utf-8"?>
-<ds:datastoreItem xmlns:ds="http://schemas.openxmlformats.org/officeDocument/2006/customXml" ds:itemID="{758FDAC0-319D-4A54-8D8E-1D42CB1F8004}">
+<ds:datastoreItem xmlns:ds="http://schemas.openxmlformats.org/officeDocument/2006/customXml" ds:itemID="{F990F116-B58F-4255-B05B-DA3808E0E5C6}">
   <ds:schemaRefs>
-    <ds:schemaRef ds:uri="http://schemas.microsoft.com/sharepoint/v3/contenttype/forms"/>
+    <ds:schemaRef ds:uri="e889e55c-35cf-43c7-aaf4-cf2500919dd8"/>
+    <ds:schemaRef ds:uri="04e01bb1-6d80-42e9-ae53-416b1e8aa845"/>
+    <ds:schemaRef ds:uri="http://schemas.microsoft.com/office/2006/documentManagement/types"/>
+    <ds:schemaRef ds:uri="http://purl.org/dc/terms/"/>
+    <ds:schemaRef ds:uri="http://purl.org/dc/dcmitype/"/>
+    <ds:schemaRef ds:uri="http://schemas.microsoft.com/office/2006/metadata/properties"/>
+    <ds:schemaRef ds:uri="http://schemas.microsoft.com/office/infopath/2007/PartnerControls"/>
+    <ds:schemaRef ds:uri="http://purl.org/dc/elements/1.1/"/>
+    <ds:schemaRef ds:uri="http://schemas.microsoft.com/sharepoint/v3"/>
+    <ds:schemaRef ds:uri="http://schemas.openxmlformats.org/package/2006/metadata/core-properties"/>
+    <ds:schemaRef ds:uri="230e9df3-be65-4c73-a93b-d1236ebd677e"/>
+    <ds:schemaRef ds:uri="http://www.w3.org/XML/1998/namespace"/>
   </ds:schemaRefs>
 </ds:datastoreItem>
 </file>
@@ -10472,20 +12105,9 @@
 </file>
 
 <file path=customXml/itemProps3.xml><?xml version="1.0" encoding="utf-8"?>
-<ds:datastoreItem xmlns:ds="http://schemas.openxmlformats.org/officeDocument/2006/customXml" ds:itemID="{F990F116-B58F-4255-B05B-DA3808E0E5C6}">
+<ds:datastoreItem xmlns:ds="http://schemas.openxmlformats.org/officeDocument/2006/customXml" ds:itemID="{758FDAC0-319D-4A54-8D8E-1D42CB1F8004}">
   <ds:schemaRefs>
-    <ds:schemaRef ds:uri="e889e55c-35cf-43c7-aaf4-cf2500919dd8"/>
-    <ds:schemaRef ds:uri="04e01bb1-6d80-42e9-ae53-416b1e8aa845"/>
-    <ds:schemaRef ds:uri="http://schemas.microsoft.com/office/2006/documentManagement/types"/>
-    <ds:schemaRef ds:uri="http://purl.org/dc/terms/"/>
-    <ds:schemaRef ds:uri="http://purl.org/dc/dcmitype/"/>
-    <ds:schemaRef ds:uri="http://schemas.microsoft.com/office/2006/metadata/properties"/>
-    <ds:schemaRef ds:uri="http://schemas.microsoft.com/office/infopath/2007/PartnerControls"/>
-    <ds:schemaRef ds:uri="http://purl.org/dc/elements/1.1/"/>
-    <ds:schemaRef ds:uri="http://schemas.microsoft.com/sharepoint/v3"/>
-    <ds:schemaRef ds:uri="http://schemas.openxmlformats.org/package/2006/metadata/core-properties"/>
-    <ds:schemaRef ds:uri="230e9df3-be65-4c73-a93b-d1236ebd677e"/>
-    <ds:schemaRef ds:uri="http://www.w3.org/XML/1998/namespace"/>
+    <ds:schemaRef ds:uri="http://schemas.microsoft.com/sharepoint/v3/contenttype/forms"/>
   </ds:schemaRefs>
 </ds:datastoreItem>
 </file>
</xml_diff>

<commit_message>
Added github link on title slide
</commit_message>
<xml_diff>
--- a/slides/155. Inchiosa_Horton_Paunic_Singliar_Chang.pptx
+++ b/slides/155. Inchiosa_Horton_Paunic_Singliar_Chang.pptx
@@ -279,7 +279,7 @@
               <a:rPr lang="en-US" smtClean="0">
                 <a:latin typeface="Segoe UI" pitchFamily="34" charset="0"/>
               </a:rPr>
-              <a:t>12/5/2017 2:22 PM</a:t>
+              <a:t>12/11/2017 2:22 PM</a:t>
             </a:fld>
             <a:endParaRPr lang="en-US" dirty="0">
               <a:latin typeface="Segoe UI" pitchFamily="34" charset="0"/>
@@ -576,7 +576,7 @@
           <a:p>
             <a:fld id="{D18B56EA-E28F-4F92-9F16-7A6F2501B303}" type="datetime8">
               <a:rPr lang="en-US" smtClean="0"/>
-              <a:t>12/5/2017 2:21 PM</a:t>
+              <a:t>12/11/2017 2:22 PM</a:t>
             </a:fld>
             <a:endParaRPr lang="en-US" dirty="0"/>
           </a:p>
@@ -962,7 +962,7 @@
           <a:p>
             <a:fld id="{C1C3D530-3419-45A5-AB8A-2242E8FDFF4E}" type="datetime8">
               <a:rPr lang="en-US" smtClean="0"/>
-              <a:t>12/5/2017 2:21 PM</a:t>
+              <a:t>12/11/2017 2:22 PM</a:t>
             </a:fld>
             <a:endParaRPr lang="en-US" dirty="0"/>
           </a:p>
@@ -1147,7 +1147,7 @@
           <a:p>
             <a:fld id="{D18B56EA-E28F-4F92-9F16-7A6F2501B303}" type="datetime8">
               <a:rPr lang="en-US" smtClean="0"/>
-              <a:t>12/5/2017 3:19 PM</a:t>
+              <a:t>12/11/2017 2:22 PM</a:t>
             </a:fld>
             <a:endParaRPr lang="en-US" dirty="0"/>
           </a:p>
@@ -1332,7 +1332,7 @@
           <a:p>
             <a:fld id="{D18B56EA-E28F-4F92-9F16-7A6F2501B303}" type="datetime8">
               <a:rPr lang="en-US" smtClean="0"/>
-              <a:t>12/5/2017 3:23 PM</a:t>
+              <a:t>12/11/2017 2:22 PM</a:t>
             </a:fld>
             <a:endParaRPr lang="en-US" dirty="0"/>
           </a:p>
@@ -1517,7 +1517,7 @@
           <a:p>
             <a:fld id="{D18B56EA-E28F-4F92-9F16-7A6F2501B303}" type="datetime8">
               <a:rPr lang="en-US" smtClean="0"/>
-              <a:t>12/6/2017 1:01 PM</a:t>
+              <a:t>12/11/2017 2:22 PM</a:t>
             </a:fld>
             <a:endParaRPr lang="en-US" dirty="0"/>
           </a:p>
@@ -1670,7 +1670,7 @@
                   <a:prstClr val="black"/>
                 </a:solidFill>
               </a:rPr>
-              <a:t>12/5/2017 2:21 PM</a:t>
+              <a:t>12/11/2017 2:22 PM</a:t>
             </a:fld>
             <a:endParaRPr lang="en-US" dirty="0">
               <a:solidFill>
@@ -1920,7 +1920,7 @@
           <a:p>
             <a:fld id="{3313C66B-7AF5-40BA-8933-D16874FF94CC}" type="datetime8">
               <a:rPr lang="en-US" smtClean="0"/>
-              <a:t>12/5/2017 2:21 PM</a:t>
+              <a:t>12/11/2017 2:22 PM</a:t>
             </a:fld>
             <a:endParaRPr lang="en-US" dirty="0"/>
           </a:p>
@@ -2283,7 +2283,7 @@
           <a:p>
             <a:fld id="{EA2B2ED8-C573-45EF-BF68-CEC19505703A}" type="datetime8">
               <a:rPr lang="en-US" smtClean="0"/>
-              <a:t>12/5/2017 2:21 PM</a:t>
+              <a:t>12/11/2017 2:22 PM</a:t>
             </a:fld>
             <a:endParaRPr lang="en-US" dirty="0"/>
           </a:p>
@@ -2483,7 +2483,7 @@
           <a:p>
             <a:fld id="{5A70A388-5CB4-42F2-85B9-1AE1F63398FA}" type="datetime8">
               <a:rPr lang="en-US" smtClean="0"/>
-              <a:t>12/5/2017 2:21 PM</a:t>
+              <a:t>12/11/2017 2:22 PM</a:t>
             </a:fld>
             <a:endParaRPr lang="en-US" dirty="0"/>
           </a:p>
@@ -2672,7 +2672,7 @@
           <a:p>
             <a:fld id="{6939CF7E-134C-4B4A-9853-17D7568CBCC2}" type="datetime8">
               <a:rPr lang="en-US" smtClean="0"/>
-              <a:t>12/5/2017 2:21 PM</a:t>
+              <a:t>12/11/2017 2:22 PM</a:t>
             </a:fld>
             <a:endParaRPr lang="en-US" dirty="0"/>
           </a:p>
@@ -2890,7 +2890,7 @@
           <a:p>
             <a:fld id="{6939CF7E-134C-4B4A-9853-17D7568CBCC2}" type="datetime8">
               <a:rPr lang="en-US" smtClean="0"/>
-              <a:t>12/5/2017 2:21 PM</a:t>
+              <a:t>12/11/2017 2:22 PM</a:t>
             </a:fld>
             <a:endParaRPr lang="en-US" dirty="0"/>
           </a:p>
@@ -3108,7 +3108,7 @@
           <a:p>
             <a:fld id="{6939CF7E-134C-4B4A-9853-17D7568CBCC2}" type="datetime8">
               <a:rPr lang="en-US" smtClean="0"/>
-              <a:t>12/5/2017 2:21 PM</a:t>
+              <a:t>12/11/2017 2:22 PM</a:t>
             </a:fld>
             <a:endParaRPr lang="en-US" dirty="0"/>
           </a:p>
@@ -3326,7 +3326,7 @@
           <a:p>
             <a:fld id="{6939CF7E-134C-4B4A-9853-17D7568CBCC2}" type="datetime8">
               <a:rPr lang="en-US" smtClean="0"/>
-              <a:t>12/5/2017 2:21 PM</a:t>
+              <a:t>12/11/2017 2:22 PM</a:t>
             </a:fld>
             <a:endParaRPr lang="en-US" dirty="0"/>
           </a:p>
@@ -3587,7 +3587,7 @@
           <a:p>
             <a:fld id="{6939CF7E-134C-4B4A-9853-17D7568CBCC2}" type="datetime8">
               <a:rPr lang="en-US" smtClean="0"/>
-              <a:t>12/5/2017 3:19 PM</a:t>
+              <a:t>12/11/2017 2:22 PM</a:t>
             </a:fld>
             <a:endParaRPr lang="en-US" dirty="0"/>
           </a:p>
@@ -8543,6 +8543,61 @@
               <a:t>Jing Chang, Senior Software Engineer</a:t>
             </a:r>
             <a:endParaRPr lang="en-US" sz="2400" dirty="0"/>
+          </a:p>
+        </p:txBody>
+      </p:sp>
+      <p:sp>
+        <p:nvSpPr>
+          <p:cNvPr id="2" name="TextBox 1">
+            <a:extLst>
+              <a:ext uri="{FF2B5EF4-FFF2-40B4-BE49-F238E27FC236}">
+                <a16:creationId xmlns:a16="http://schemas.microsoft.com/office/drawing/2014/main" id="{BDDC9C70-4055-42F7-84C2-64922145E5B3}"/>
+              </a:ext>
+            </a:extLst>
+          </p:cNvPr>
+          <p:cNvSpPr txBox="1"/>
+          <p:nvPr/>
+        </p:nvSpPr>
+        <p:spPr>
+          <a:xfrm>
+            <a:off x="274701" y="6164262"/>
+            <a:ext cx="6553200" cy="627864"/>
+          </a:xfrm>
+          <a:prstGeom prst="rect">
+            <a:avLst/>
+          </a:prstGeom>
+          <a:noFill/>
+        </p:spPr>
+        <p:txBody>
+          <a:bodyPr wrap="square" lIns="182880" tIns="146304" rIns="182880" bIns="146304" rtlCol="0">
+            <a:spAutoFit/>
+          </a:bodyPr>
+          <a:lstStyle/>
+          <a:p>
+            <a:pPr>
+              <a:lnSpc>
+                <a:spcPct val="90000"/>
+              </a:lnSpc>
+              <a:spcAft>
+                <a:spcPts val="600"/>
+              </a:spcAft>
+            </a:pPr>
+            <a:r>
+              <a:rPr lang="en-US" sz="2400" dirty="0">
+                <a:gradFill>
+                  <a:gsLst>
+                    <a:gs pos="2917">
+                      <a:schemeClr val="tx1"/>
+                    </a:gs>
+                    <a:gs pos="30000">
+                      <a:schemeClr val="tx1"/>
+                    </a:gs>
+                  </a:gsLst>
+                  <a:lin ang="5400000" scaled="0"/>
+                </a:gradFill>
+              </a:rPr>
+              <a:t>https://github.com/Azure/MLADS2017ML</a:t>
+            </a:r>
           </a:p>
         </p:txBody>
       </p:sp>
@@ -11566,94 +11621,12 @@
 </file>
 
 <file path=customXml/item1.xml><?xml version="1.0" encoding="utf-8"?>
-<p:properties xmlns:p="http://schemas.microsoft.com/office/2006/metadata/properties" xmlns:xsi="http://www.w3.org/2001/XMLSchema-instance" xmlns:pc="http://schemas.microsoft.com/office/infopath/2007/PartnerControls">
-  <documentManagement>
-    <LikesCount xmlns="http://schemas.microsoft.com/sharepoint/v3" xsi:nil="true"/>
-    <_ip_UnifiedCompliancePolicyUIAction xmlns="http://schemas.microsoft.com/sharepoint/v3" xsi:nil="true"/>
-    <_ip_UnifiedCompliancePolicyProperties xmlns="http://schemas.microsoft.com/sharepoint/v3" xsi:nil="true"/>
-    <TaxKeywordTaxHTField xmlns="230e9df3-be65-4c73-a93b-d1236ebd677e">
-      <Terms xmlns="http://schemas.microsoft.com/office/infopath/2007/PartnerControls">
-        <TermInfo xmlns="http://schemas.microsoft.com/office/infopath/2007/PartnerControls">
-          <TermName xmlns="http://schemas.microsoft.com/office/infopath/2007/PartnerControls">machine learning</TermName>
-          <TermId xmlns="http://schemas.microsoft.com/office/infopath/2007/PartnerControls">912b89bd-3197-4d37-838b-dea3c299099a</TermId>
-        </TermInfo>
-        <TermInfo xmlns="http://schemas.microsoft.com/office/infopath/2007/PartnerControls">
-          <TermName xmlns="http://schemas.microsoft.com/office/infopath/2007/PartnerControls">AI ＆ Data Science Conference</TermName>
-          <TermId xmlns="http://schemas.microsoft.com/office/infopath/2007/PartnerControls">8f010730-a012-41a8-b19a-7b5a9af03b6a</TermId>
-        </TermInfo>
-      </Terms>
-    </TaxKeywordTaxHTField>
-    <TaxCatchAll xmlns="230e9df3-be65-4c73-a93b-d1236ebd677e">
-      <Value>69</Value>
-      <Value>131</Value>
-      <Value>20</Value>
-      <Value>72</Value>
-      <Value>169</Value>
-    </TaxCatchAll>
-    <Event_x0020_Start_x0020_Date xmlns="04e01bb1-6d80-42e9-ae53-416b1e8aa845">2017-12-07T00:00:00+00:00</Event_x0020_Start_x0020_Date>
-    <External_x0020_Speaker xmlns="04e01bb1-6d80-42e9-ae53-416b1e8aa845" xsi:nil="true"/>
-    <Presentation_x0020_Date xmlns="04e01bb1-6d80-42e9-ae53-416b1e8aa845" xsi:nil="true"/>
-    <MS_x0020_Content_x0020_Owner xmlns="04e01bb1-6d80-42e9-ae53-416b1e8aa845">
-      <UserInfo>
-        <DisplayName/>
-        <AccountId xsi:nil="true"/>
-        <AccountType/>
-      </UserInfo>
-    </MS_x0020_Content_x0020_Owner>
-    <Session_x0020_Code xmlns="04e01bb1-6d80-42e9-ae53-416b1e8aa845" xsi:nil="true"/>
-    <Event_x0020_End_x0020_Date xmlns="04e01bb1-6d80-42e9-ae53-416b1e8aa845">2017-12-08T00:00:00+00:00</Event_x0020_End_x0020_Date>
-    <MS_x0020_Speaker xmlns="04e01bb1-6d80-42e9-ae53-416b1e8aa845">
-      <UserInfo>
-        <DisplayName/>
-        <AccountId xsi:nil="true"/>
-        <AccountType/>
-      </UserInfo>
-    </MS_x0020_Speaker>
-    <_x0062_bc8 xmlns="e889e55c-35cf-43c7-aaf4-cf2500919dd8">
-      <UserInfo>
-        <DisplayName/>
-        <AccountId xsi:nil="true"/>
-        <AccountType/>
-      </UserInfo>
-    </_x0062_bc8>
-    <fb4e50409e3b4517bb965b3c7125e153 xmlns="04e01bb1-6d80-42e9-ae53-416b1e8aa845">
-      <Terms xmlns="http://schemas.microsoft.com/office/infopath/2007/PartnerControls"/>
-    </fb4e50409e3b4517bb965b3c7125e153>
-    <l61c8586195b4657a1f710a539f9bc3a xmlns="04e01bb1-6d80-42e9-ae53-416b1e8aa845">
-      <Terms xmlns="http://schemas.microsoft.com/office/infopath/2007/PartnerControls">
-        <TermInfo xmlns="http://schemas.microsoft.com/office/infopath/2007/PartnerControls">
-          <TermName xmlns="http://schemas.microsoft.com/office/infopath/2007/PartnerControls">Microsoft Conference Center</TermName>
-          <TermId xmlns="http://schemas.microsoft.com/office/infopath/2007/PartnerControls">9ee5e79d-18a6-44c6-bfde-7021198eb4fc</TermId>
-        </TermInfo>
-      </Terms>
-    </l61c8586195b4657a1f710a539f9bc3a>
-    <a645af38eebb4a1ea4744f163c56ea26 xmlns="04e01bb1-6d80-42e9-ae53-416b1e8aa845">
-      <Terms xmlns="http://schemas.microsoft.com/office/infopath/2007/PartnerControls"/>
-    </a645af38eebb4a1ea4744f163c56ea26>
-    <g60601ae6c3e4c409eb6a70077dda16d xmlns="04e01bb1-6d80-42e9-ae53-416b1e8aa845">
-      <Terms xmlns="http://schemas.microsoft.com/office/infopath/2007/PartnerControls">
-        <TermInfo xmlns="http://schemas.microsoft.com/office/infopath/2007/PartnerControls">
-          <TermName xmlns="http://schemas.microsoft.com/office/infopath/2007/PartnerControls">Microsoft Redmond Campus</TermName>
-          <TermId xmlns="http://schemas.microsoft.com/office/infopath/2007/PartnerControls">3cd96142-cb30-40de-9c66-cd17f1bb8ca1</TermId>
-        </TermInfo>
-      </Terms>
-    </g60601ae6c3e4c409eb6a70077dda16d>
-    <e6bd9c8ce3ed4fe68161c78952f36fbc xmlns="04e01bb1-6d80-42e9-ae53-416b1e8aa845">
-      <Terms xmlns="http://schemas.microsoft.com/office/infopath/2007/PartnerControls"/>
-    </e6bd9c8ce3ed4fe68161c78952f36fbc>
-    <e349cd3f156b4e7d8653c9cd4f2d8fb4 xmlns="04e01bb1-6d80-42e9-ae53-416b1e8aa845">
-      <Terms xmlns="http://schemas.microsoft.com/office/infopath/2007/PartnerControls">
-        <TermInfo xmlns="http://schemas.microsoft.com/office/infopath/2007/PartnerControls">
-          <TermName xmlns="http://schemas.microsoft.com/office/infopath/2007/PartnerControls">Machine Learning, AI and Data Science Conference</TermName>
-          <TermId xmlns="http://schemas.microsoft.com/office/infopath/2007/PartnerControls">2f5995e3-1e3d-4c27-96d6-c6c80990926c</TermId>
-        </TermInfo>
-      </Terms>
-    </e349cd3f156b4e7d8653c9cd4f2d8fb4>
-    <c2f1b796fca04ddbb48af271e99c8750 xmlns="04e01bb1-6d80-42e9-ae53-416b1e8aa845">
-      <Terms xmlns="http://schemas.microsoft.com/office/infopath/2007/PartnerControls"/>
-    </c2f1b796fca04ddbb48af271e99c8750>
-  </documentManagement>
-</p:properties>
+<?mso-contentType ?>
+<FormTemplates xmlns="http://schemas.microsoft.com/sharepoint/v3/contenttype/forms">
+  <Display>DocumentLibraryForm</Display>
+  <Edit>DocumentLibraryForm</Edit>
+  <New>DocumentLibraryForm</New>
+</FormTemplates>
 </file>
 
 <file path=customXml/item2.xml><?xml version="1.0" encoding="utf-8"?>
@@ -12056,29 +12029,100 @@
 </file>
 
 <file path=customXml/item3.xml><?xml version="1.0" encoding="utf-8"?>
-<?mso-contentType ?>
-<FormTemplates xmlns="http://schemas.microsoft.com/sharepoint/v3/contenttype/forms">
-  <Display>DocumentLibraryForm</Display>
-  <Edit>DocumentLibraryForm</Edit>
-  <New>DocumentLibraryForm</New>
-</FormTemplates>
+<p:properties xmlns:p="http://schemas.microsoft.com/office/2006/metadata/properties" xmlns:xsi="http://www.w3.org/2001/XMLSchema-instance" xmlns:pc="http://schemas.microsoft.com/office/infopath/2007/PartnerControls">
+  <documentManagement>
+    <LikesCount xmlns="http://schemas.microsoft.com/sharepoint/v3" xsi:nil="true"/>
+    <_ip_UnifiedCompliancePolicyUIAction xmlns="http://schemas.microsoft.com/sharepoint/v3" xsi:nil="true"/>
+    <_ip_UnifiedCompliancePolicyProperties xmlns="http://schemas.microsoft.com/sharepoint/v3" xsi:nil="true"/>
+    <TaxKeywordTaxHTField xmlns="230e9df3-be65-4c73-a93b-d1236ebd677e">
+      <Terms xmlns="http://schemas.microsoft.com/office/infopath/2007/PartnerControls">
+        <TermInfo xmlns="http://schemas.microsoft.com/office/infopath/2007/PartnerControls">
+          <TermName xmlns="http://schemas.microsoft.com/office/infopath/2007/PartnerControls">machine learning</TermName>
+          <TermId xmlns="http://schemas.microsoft.com/office/infopath/2007/PartnerControls">912b89bd-3197-4d37-838b-dea3c299099a</TermId>
+        </TermInfo>
+        <TermInfo xmlns="http://schemas.microsoft.com/office/infopath/2007/PartnerControls">
+          <TermName xmlns="http://schemas.microsoft.com/office/infopath/2007/PartnerControls">AI ＆ Data Science Conference</TermName>
+          <TermId xmlns="http://schemas.microsoft.com/office/infopath/2007/PartnerControls">8f010730-a012-41a8-b19a-7b5a9af03b6a</TermId>
+        </TermInfo>
+      </Terms>
+    </TaxKeywordTaxHTField>
+    <TaxCatchAll xmlns="230e9df3-be65-4c73-a93b-d1236ebd677e">
+      <Value>69</Value>
+      <Value>131</Value>
+      <Value>20</Value>
+      <Value>72</Value>
+      <Value>169</Value>
+    </TaxCatchAll>
+    <Event_x0020_Start_x0020_Date xmlns="04e01bb1-6d80-42e9-ae53-416b1e8aa845">2017-12-07T00:00:00+00:00</Event_x0020_Start_x0020_Date>
+    <External_x0020_Speaker xmlns="04e01bb1-6d80-42e9-ae53-416b1e8aa845" xsi:nil="true"/>
+    <Presentation_x0020_Date xmlns="04e01bb1-6d80-42e9-ae53-416b1e8aa845" xsi:nil="true"/>
+    <MS_x0020_Content_x0020_Owner xmlns="04e01bb1-6d80-42e9-ae53-416b1e8aa845">
+      <UserInfo>
+        <DisplayName/>
+        <AccountId xsi:nil="true"/>
+        <AccountType/>
+      </UserInfo>
+    </MS_x0020_Content_x0020_Owner>
+    <Session_x0020_Code xmlns="04e01bb1-6d80-42e9-ae53-416b1e8aa845" xsi:nil="true"/>
+    <Event_x0020_End_x0020_Date xmlns="04e01bb1-6d80-42e9-ae53-416b1e8aa845">2017-12-08T00:00:00+00:00</Event_x0020_End_x0020_Date>
+    <MS_x0020_Speaker xmlns="04e01bb1-6d80-42e9-ae53-416b1e8aa845">
+      <UserInfo>
+        <DisplayName/>
+        <AccountId xsi:nil="true"/>
+        <AccountType/>
+      </UserInfo>
+    </MS_x0020_Speaker>
+    <_x0062_bc8 xmlns="e889e55c-35cf-43c7-aaf4-cf2500919dd8">
+      <UserInfo>
+        <DisplayName/>
+        <AccountId xsi:nil="true"/>
+        <AccountType/>
+      </UserInfo>
+    </_x0062_bc8>
+    <fb4e50409e3b4517bb965b3c7125e153 xmlns="04e01bb1-6d80-42e9-ae53-416b1e8aa845">
+      <Terms xmlns="http://schemas.microsoft.com/office/infopath/2007/PartnerControls"/>
+    </fb4e50409e3b4517bb965b3c7125e153>
+    <l61c8586195b4657a1f710a539f9bc3a xmlns="04e01bb1-6d80-42e9-ae53-416b1e8aa845">
+      <Terms xmlns="http://schemas.microsoft.com/office/infopath/2007/PartnerControls">
+        <TermInfo xmlns="http://schemas.microsoft.com/office/infopath/2007/PartnerControls">
+          <TermName xmlns="http://schemas.microsoft.com/office/infopath/2007/PartnerControls">Microsoft Conference Center</TermName>
+          <TermId xmlns="http://schemas.microsoft.com/office/infopath/2007/PartnerControls">9ee5e79d-18a6-44c6-bfde-7021198eb4fc</TermId>
+        </TermInfo>
+      </Terms>
+    </l61c8586195b4657a1f710a539f9bc3a>
+    <a645af38eebb4a1ea4744f163c56ea26 xmlns="04e01bb1-6d80-42e9-ae53-416b1e8aa845">
+      <Terms xmlns="http://schemas.microsoft.com/office/infopath/2007/PartnerControls"/>
+    </a645af38eebb4a1ea4744f163c56ea26>
+    <g60601ae6c3e4c409eb6a70077dda16d xmlns="04e01bb1-6d80-42e9-ae53-416b1e8aa845">
+      <Terms xmlns="http://schemas.microsoft.com/office/infopath/2007/PartnerControls">
+        <TermInfo xmlns="http://schemas.microsoft.com/office/infopath/2007/PartnerControls">
+          <TermName xmlns="http://schemas.microsoft.com/office/infopath/2007/PartnerControls">Microsoft Redmond Campus</TermName>
+          <TermId xmlns="http://schemas.microsoft.com/office/infopath/2007/PartnerControls">3cd96142-cb30-40de-9c66-cd17f1bb8ca1</TermId>
+        </TermInfo>
+      </Terms>
+    </g60601ae6c3e4c409eb6a70077dda16d>
+    <e6bd9c8ce3ed4fe68161c78952f36fbc xmlns="04e01bb1-6d80-42e9-ae53-416b1e8aa845">
+      <Terms xmlns="http://schemas.microsoft.com/office/infopath/2007/PartnerControls"/>
+    </e6bd9c8ce3ed4fe68161c78952f36fbc>
+    <e349cd3f156b4e7d8653c9cd4f2d8fb4 xmlns="04e01bb1-6d80-42e9-ae53-416b1e8aa845">
+      <Terms xmlns="http://schemas.microsoft.com/office/infopath/2007/PartnerControls">
+        <TermInfo xmlns="http://schemas.microsoft.com/office/infopath/2007/PartnerControls">
+          <TermName xmlns="http://schemas.microsoft.com/office/infopath/2007/PartnerControls">Machine Learning, AI and Data Science Conference</TermName>
+          <TermId xmlns="http://schemas.microsoft.com/office/infopath/2007/PartnerControls">2f5995e3-1e3d-4c27-96d6-c6c80990926c</TermId>
+        </TermInfo>
+      </Terms>
+    </e349cd3f156b4e7d8653c9cd4f2d8fb4>
+    <c2f1b796fca04ddbb48af271e99c8750 xmlns="04e01bb1-6d80-42e9-ae53-416b1e8aa845">
+      <Terms xmlns="http://schemas.microsoft.com/office/infopath/2007/PartnerControls"/>
+    </c2f1b796fca04ddbb48af271e99c8750>
+  </documentManagement>
+</p:properties>
 </file>
 
 <file path=customXml/itemProps1.xml><?xml version="1.0" encoding="utf-8"?>
-<ds:datastoreItem xmlns:ds="http://schemas.openxmlformats.org/officeDocument/2006/customXml" ds:itemID="{F990F116-B58F-4255-B05B-DA3808E0E5C6}">
+<ds:datastoreItem xmlns:ds="http://schemas.openxmlformats.org/officeDocument/2006/customXml" ds:itemID="{758FDAC0-319D-4A54-8D8E-1D42CB1F8004}">
   <ds:schemaRefs>
-    <ds:schemaRef ds:uri="e889e55c-35cf-43c7-aaf4-cf2500919dd8"/>
-    <ds:schemaRef ds:uri="04e01bb1-6d80-42e9-ae53-416b1e8aa845"/>
-    <ds:schemaRef ds:uri="http://schemas.microsoft.com/office/2006/documentManagement/types"/>
-    <ds:schemaRef ds:uri="http://purl.org/dc/terms/"/>
-    <ds:schemaRef ds:uri="http://purl.org/dc/dcmitype/"/>
-    <ds:schemaRef ds:uri="http://schemas.microsoft.com/office/2006/metadata/properties"/>
-    <ds:schemaRef ds:uri="http://schemas.microsoft.com/office/infopath/2007/PartnerControls"/>
-    <ds:schemaRef ds:uri="http://purl.org/dc/elements/1.1/"/>
-    <ds:schemaRef ds:uri="http://schemas.microsoft.com/sharepoint/v3"/>
-    <ds:schemaRef ds:uri="http://schemas.openxmlformats.org/package/2006/metadata/core-properties"/>
-    <ds:schemaRef ds:uri="230e9df3-be65-4c73-a93b-d1236ebd677e"/>
-    <ds:schemaRef ds:uri="http://www.w3.org/XML/1998/namespace"/>
+    <ds:schemaRef ds:uri="http://schemas.microsoft.com/sharepoint/v3/contenttype/forms"/>
   </ds:schemaRefs>
 </ds:datastoreItem>
 </file>
@@ -12105,9 +12149,20 @@
 </file>
 
 <file path=customXml/itemProps3.xml><?xml version="1.0" encoding="utf-8"?>
-<ds:datastoreItem xmlns:ds="http://schemas.openxmlformats.org/officeDocument/2006/customXml" ds:itemID="{758FDAC0-319D-4A54-8D8E-1D42CB1F8004}">
+<ds:datastoreItem xmlns:ds="http://schemas.openxmlformats.org/officeDocument/2006/customXml" ds:itemID="{F990F116-B58F-4255-B05B-DA3808E0E5C6}">
   <ds:schemaRefs>
-    <ds:schemaRef ds:uri="http://schemas.microsoft.com/sharepoint/v3/contenttype/forms"/>
+    <ds:schemaRef ds:uri="e889e55c-35cf-43c7-aaf4-cf2500919dd8"/>
+    <ds:schemaRef ds:uri="04e01bb1-6d80-42e9-ae53-416b1e8aa845"/>
+    <ds:schemaRef ds:uri="http://schemas.microsoft.com/office/2006/documentManagement/types"/>
+    <ds:schemaRef ds:uri="http://purl.org/dc/terms/"/>
+    <ds:schemaRef ds:uri="http://purl.org/dc/dcmitype/"/>
+    <ds:schemaRef ds:uri="http://schemas.microsoft.com/office/2006/metadata/properties"/>
+    <ds:schemaRef ds:uri="http://schemas.microsoft.com/office/infopath/2007/PartnerControls"/>
+    <ds:schemaRef ds:uri="http://purl.org/dc/elements/1.1/"/>
+    <ds:schemaRef ds:uri="http://schemas.microsoft.com/sharepoint/v3"/>
+    <ds:schemaRef ds:uri="http://schemas.openxmlformats.org/package/2006/metadata/core-properties"/>
+    <ds:schemaRef ds:uri="230e9df3-be65-4c73-a93b-d1236ebd677e"/>
+    <ds:schemaRef ds:uri="http://www.w3.org/XML/1998/namespace"/>
   </ds:schemaRefs>
 </ds:datastoreItem>
 </file>
</xml_diff>